<commit_message>
Fixed some fund fees
</commit_message>
<xml_diff>
--- a/presentations/powerpoint output.pptx
+++ b/presentations/powerpoint output.pptx
@@ -15,6 +15,13 @@
     <p:sldId id="263" r:id="rId9"/>
     <p:sldId id="264" r:id="rId10"/>
     <p:sldId id="265" r:id="rId11"/>
+    <p:sldId id="266" r:id="rId12"/>
+    <p:sldId id="267" r:id="rId13"/>
+    <p:sldId id="268" r:id="rId14"/>
+    <p:sldId id="269" r:id="rId15"/>
+    <p:sldId id="270" r:id="rId16"/>
+    <p:sldId id="271" r:id="rId17"/>
+    <p:sldId id="272" r:id="rId18"/>
   </p:sldIdLst>
   <p:sldSz cx="9144000" cy="5143500" type="screen16x9"/>
   <p:notesSz cx="6858000" cy="9144000"/>
@@ -3124,7 +3131,7 @@
             </a:pPr>
             <a:r>
               <a:rPr/>
-              <a:t>ppt formatted presentation</a:t>
+              <a:t>Agregar Trend Following a un portafolio</a:t>
             </a:r>
           </a:p>
         </p:txBody>
@@ -3258,6 +3265,616 @@
           </a:ln>
         </p:spPr>
       </p:pic>
+    </p:spTree>
+  </p:cSld>
+</p:sld>
+</file>
+
+<file path=ppt/slides/slide11.xml><?xml version="1.0" encoding="utf-8"?>
+<p:sld xmlns:a="http://schemas.openxmlformats.org/drawingml/2006/main" xmlns:r="http://schemas.openxmlformats.org/officeDocument/2006/relationships" xmlns:p="http://schemas.openxmlformats.org/presentationml/2006/main">
+  <p:cSld>
+    <p:spTree>
+      <p:nvGrpSpPr>
+        <p:cNvPr id="1" name=""/>
+        <p:cNvGrpSpPr/>
+        <p:nvPr/>
+      </p:nvGrpSpPr>
+      <p:grpSpPr>
+        <a:xfrm>
+          <a:off x="0" y="0"/>
+          <a:ext cx="0" cy="0"/>
+          <a:chOff x="0" y="0"/>
+          <a:chExt cx="0" cy="0"/>
+        </a:xfrm>
+      </p:grpSpPr>
+      <p:sp>
+        <p:nvSpPr>
+          <p:cNvPr id="4" name="Text Placeholder 3"/>
+          <p:cNvSpPr>
+            <a:spLocks noGrp="1"/>
+          </p:cNvSpPr>
+          <p:nvPr>
+            <p:ph idx="2" sz="half" type="body"/>
+          </p:nvPr>
+        </p:nvSpPr>
+        <p:spPr/>
+        <p:txBody>
+          <a:bodyPr/>
+          <a:lstStyle/>
+          <a:p>
+            <a:pPr lvl="0" indent="0" marL="0">
+              <a:buNone/>
+            </a:pPr>
+            <a:r>
+              <a:rPr/>
+              <a:t>Los fondos más volátiles pierden muchos activos en momentos de caída.</a:t>
+            </a:r>
+          </a:p>
+          <a:p>
+            <a:pPr lvl="0" indent="0" marL="0">
+              <a:spcBef>
+                <a:spcPts val="3000"/>
+              </a:spcBef>
+              <a:buNone/>
+            </a:pPr>
+            <a:r>
+              <a:rPr b="1"/>
+              <a:t>Riesgo de negocio: efecto en el retorno ($100)</a:t>
+            </a:r>
+          </a:p>
+          <a:p>
+            <a:pPr lvl="0"/>
+            <a:r>
+              <a:rPr/>
+              <a:t>ESCENARIO A: Mismo manager</a:t>
+            </a:r>
+          </a:p>
+          <a:p>
+            <a:pPr lvl="1"/>
+            <a:r>
+              <a:rPr/>
+              <a:t>Resultado de -$20 + Resultado de +$20 = $100</a:t>
+            </a:r>
+          </a:p>
+          <a:p>
+            <a:pPr lvl="0"/>
+            <a:r>
+              <a:rPr/>
+              <a:t>ESCENARIO B: Cambio de manager</a:t>
+            </a:r>
+          </a:p>
+          <a:p>
+            <a:pPr lvl="1"/>
+            <a:r>
+              <a:rPr/>
+              <a:t>Resultado de -$20 -&gt;</a:t>
+            </a:r>
+          </a:p>
+          <a:p>
+            <a:pPr lvl="1"/>
+            <a:r>
+              <a:rPr/>
+              <a:t>Cambio de manager</a:t>
+            </a:r>
+          </a:p>
+          <a:p>
+            <a:pPr lvl="1"/>
+            <a:r>
+              <a:rPr/>
+              <a:t>Resultado de +20 - success fee de $4 nuevo manager = $96</a:t>
+            </a:r>
+          </a:p>
+          <a:p>
+            <a:pPr lvl="0" indent="0" marL="0">
+              <a:buNone/>
+            </a:pPr>
+            <a:r>
+              <a:rPr/>
+              <a:t>Supone un success fee del 20%.</a:t>
+            </a:r>
+          </a:p>
+          <a:p>
+            <a:pPr lvl="0" indent="0" marL="0">
+              <a:buNone/>
+            </a:pPr>
+            <a:r>
+              <a:rPr/>
+              <a:t>Al cambiar de manager se pierde el ‘high watermark’.</a:t>
+            </a:r>
+          </a:p>
+          <a:p>
+            <a:pPr lvl="0" indent="0" marL="0">
+              <a:spcBef>
+                <a:spcPts val="3000"/>
+              </a:spcBef>
+              <a:buNone/>
+            </a:pPr>
+            <a:r>
+              <a:rPr b="1"/>
+              <a:t>Riesgo de negocio y High Watermark</a:t>
+            </a:r>
+          </a:p>
+        </p:txBody>
+      </p:sp>
+      <p:pic>
+        <p:nvPicPr>
+          <p:cNvPr descr="images/high%20watermark.png" id="0" name="Picture 1"/>
+          <p:cNvPicPr>
+            <a:picLocks noGrp="1" noChangeAspect="1"/>
+          </p:cNvPicPr>
+          <p:nvPr/>
+        </p:nvPicPr>
+        <p:blipFill>
+          <a:blip r:embed="rId2"/>
+          <a:stretch>
+            <a:fillRect/>
+          </a:stretch>
+        </p:blipFill>
+        <p:spPr bwMode="auto">
+          <a:xfrm>
+            <a:off x="3568700" y="1104900"/>
+            <a:ext cx="5105400" cy="2578100"/>
+          </a:xfrm>
+          <a:prstGeom prst="rect">
+            <a:avLst/>
+          </a:prstGeom>
+          <a:noFill/>
+          <a:ln w="9525">
+            <a:noFill/>
+            <a:headEnd/>
+            <a:tailEnd/>
+          </a:ln>
+        </p:spPr>
+      </p:pic>
+    </p:spTree>
+  </p:cSld>
+</p:sld>
+</file>
+
+<file path=ppt/slides/slide12.xml><?xml version="1.0" encoding="utf-8"?>
+<p:sld xmlns:a="http://schemas.openxmlformats.org/drawingml/2006/main" xmlns:r="http://schemas.openxmlformats.org/officeDocument/2006/relationships" xmlns:p="http://schemas.openxmlformats.org/presentationml/2006/main">
+  <p:cSld>
+    <p:spTree>
+      <p:nvGrpSpPr>
+        <p:cNvPr id="1" name=""/>
+        <p:cNvGrpSpPr/>
+        <p:nvPr/>
+      </p:nvGrpSpPr>
+      <p:grpSpPr>
+        <a:xfrm>
+          <a:off x="0" y="0"/>
+          <a:ext cx="0" cy="0"/>
+          <a:chOff x="0" y="0"/>
+          <a:chExt cx="0" cy="0"/>
+        </a:xfrm>
+      </p:grpSpPr>
+      <p:sp>
+        <p:nvSpPr>
+          <p:cNvPr id="3" name="Content Placeholder 2"/>
+          <p:cNvSpPr>
+            <a:spLocks noGrp="1"/>
+          </p:cNvSpPr>
+          <p:nvPr>
+            <p:ph idx="1"/>
+          </p:nvPr>
+        </p:nvSpPr>
+        <p:spPr/>
+        <p:txBody>
+          <a:bodyPr/>
+          <a:lstStyle/>
+          <a:p>
+            <a:pPr lvl="0" indent="0" marL="0">
+              <a:buNone/>
+            </a:pPr>
+            <a:r>
+              <a:rPr/>
+              <a:t>Asumiendo un performance fee de 20%</a:t>
+            </a:r>
+          </a:p>
+          <a:p>
+            <a:pPr lvl="0" indent="0" marL="0">
+              <a:spcBef>
+                <a:spcPts val="3000"/>
+              </a:spcBef>
+              <a:buNone/>
+            </a:pPr>
+            <a:r>
+              <a:rPr b="1"/>
+              <a:t>Efectos del benchmark</a:t>
+            </a:r>
+          </a:p>
+          <a:p>
+            <a:pPr lvl="0" indent="0" marL="0">
+              <a:spcBef>
+                <a:spcPts val="3000"/>
+              </a:spcBef>
+              <a:buNone/>
+            </a:pPr>
+            <a:r>
+              <a:rPr b="1"/>
+              <a:t>Efectos de trend following</a:t>
+            </a:r>
+          </a:p>
+        </p:txBody>
+      </p:sp>
+    </p:spTree>
+  </p:cSld>
+</p:sld>
+</file>
+
+<file path=ppt/slides/slide13.xml><?xml version="1.0" encoding="utf-8"?>
+<p:sld xmlns:a="http://schemas.openxmlformats.org/drawingml/2006/main" xmlns:r="http://schemas.openxmlformats.org/officeDocument/2006/relationships" xmlns:p="http://schemas.openxmlformats.org/presentationml/2006/main">
+  <p:cSld>
+    <p:spTree>
+      <p:nvGrpSpPr>
+        <p:cNvPr id="1" name=""/>
+        <p:cNvGrpSpPr/>
+        <p:nvPr/>
+      </p:nvGrpSpPr>
+      <p:grpSpPr>
+        <a:xfrm>
+          <a:off x="0" y="0"/>
+          <a:ext cx="0" cy="0"/>
+          <a:chOff x="0" y="0"/>
+          <a:chExt cx="0" cy="0"/>
+        </a:xfrm>
+      </p:grpSpPr>
+      <p:sp>
+        <p:nvSpPr>
+          <p:cNvPr id="2" name="Title 1"/>
+          <p:cNvSpPr>
+            <a:spLocks noGrp="1"/>
+          </p:cNvSpPr>
+          <p:nvPr>
+            <p:ph type="title"/>
+          </p:nvPr>
+        </p:nvSpPr>
+        <p:spPr/>
+        <p:txBody>
+          <a:bodyPr/>
+          <a:lstStyle/>
+          <a:p>
+            <a:pPr lvl="0" indent="0" marL="0">
+              <a:buNone/>
+            </a:pPr>
+            <a:r>
+              <a:rPr/>
+              <a:t>Fondos recomendados. Fees y otros datos.</a:t>
+            </a:r>
+          </a:p>
+        </p:txBody>
+      </p:sp>
+      <p:pic>
+        <p:nvPicPr>
+          <p:cNvPr descr="powerpoint-output_files/figure-pptx/unnamed-chunk-3-1.png" id="0" name="Picture 1"/>
+          <p:cNvPicPr>
+            <a:picLocks noGrp="1" noChangeAspect="1"/>
+          </p:cNvPicPr>
+          <p:nvPr/>
+        </p:nvPicPr>
+        <p:blipFill>
+          <a:blip r:embed="rId2"/>
+          <a:stretch>
+            <a:fillRect/>
+          </a:stretch>
+        </p:blipFill>
+        <p:spPr bwMode="auto">
+          <a:xfrm>
+            <a:off x="1181100" y="1193800"/>
+            <a:ext cx="6781800" cy="3390900"/>
+          </a:xfrm>
+          <a:prstGeom prst="rect">
+            <a:avLst/>
+          </a:prstGeom>
+          <a:noFill/>
+          <a:ln w="9525">
+            <a:noFill/>
+            <a:headEnd/>
+            <a:tailEnd/>
+          </a:ln>
+        </p:spPr>
+      </p:pic>
+    </p:spTree>
+  </p:cSld>
+</p:sld>
+</file>
+
+<file path=ppt/slides/slide14.xml><?xml version="1.0" encoding="utf-8"?>
+<p:sld xmlns:a="http://schemas.openxmlformats.org/drawingml/2006/main" xmlns:r="http://schemas.openxmlformats.org/officeDocument/2006/relationships" xmlns:p="http://schemas.openxmlformats.org/presentationml/2006/main">
+  <p:cSld>
+    <p:spTree>
+      <p:nvGrpSpPr>
+        <p:cNvPr id="1" name=""/>
+        <p:cNvGrpSpPr/>
+        <p:nvPr/>
+      </p:nvGrpSpPr>
+      <p:grpSpPr>
+        <a:xfrm>
+          <a:off x="0" y="0"/>
+          <a:ext cx="0" cy="0"/>
+          <a:chOff x="0" y="0"/>
+          <a:chExt cx="0" cy="0"/>
+        </a:xfrm>
+      </p:grpSpPr>
+      <p:sp>
+        <p:nvSpPr>
+          <p:cNvPr id="2" name="Title 1"/>
+          <p:cNvSpPr>
+            <a:spLocks noGrp="1"/>
+          </p:cNvSpPr>
+          <p:nvPr>
+            <p:ph type="title"/>
+          </p:nvPr>
+        </p:nvSpPr>
+        <p:spPr>
+          <a:xfrm>
+            <a:off x="457201" y="204787"/>
+            <a:ext cx="3008313" cy="871538"/>
+          </a:xfrm>
+        </p:spPr>
+        <p:txBody>
+          <a:bodyPr/>
+          <a:lstStyle/>
+          <a:p>
+            <a:pPr lvl="0" indent="0" marL="0">
+              <a:buNone/>
+            </a:pPr>
+            <a:r>
+              <a:rPr/>
+              <a:t>Fondos individuales</a:t>
+            </a:r>
+          </a:p>
+        </p:txBody>
+      </p:sp>
+      <p:sp>
+        <p:nvSpPr>
+          <p:cNvPr id="4" name="Text Placeholder 3"/>
+          <p:cNvSpPr>
+            <a:spLocks noGrp="1"/>
+          </p:cNvSpPr>
+          <p:nvPr>
+            <p:ph idx="2" sz="half" type="body"/>
+          </p:nvPr>
+        </p:nvSpPr>
+        <p:spPr/>
+        <p:txBody>
+          <a:bodyPr/>
+          <a:lstStyle/>
+          <a:p>
+            <a:pPr lvl="0" indent="0" marL="0">
+              <a:spcBef>
+                <a:spcPts val="3000"/>
+              </a:spcBef>
+              <a:buNone/>
+            </a:pPr>
+            <a:r>
+              <a:rPr b="1"/>
+              <a:t>Crabel</a:t>
+            </a:r>
+          </a:p>
+        </p:txBody>
+      </p:sp>
+      <p:pic>
+        <p:nvPicPr>
+          <p:cNvPr descr="images/Crabel%20Advanced%20Trend.png" id="0" name="Picture 1"/>
+          <p:cNvPicPr>
+            <a:picLocks noGrp="1" noChangeAspect="1"/>
+          </p:cNvPicPr>
+          <p:nvPr/>
+        </p:nvPicPr>
+        <p:blipFill>
+          <a:blip r:embed="rId2"/>
+          <a:stretch>
+            <a:fillRect/>
+          </a:stretch>
+        </p:blipFill>
+        <p:spPr bwMode="auto">
+          <a:xfrm>
+            <a:off x="3568700" y="1460500"/>
+            <a:ext cx="5105400" cy="1854200"/>
+          </a:xfrm>
+          <a:prstGeom prst="rect">
+            <a:avLst/>
+          </a:prstGeom>
+          <a:noFill/>
+          <a:ln w="9525">
+            <a:noFill/>
+            <a:headEnd/>
+            <a:tailEnd/>
+          </a:ln>
+        </p:spPr>
+      </p:pic>
+    </p:spTree>
+  </p:cSld>
+</p:sld>
+</file>
+
+<file path=ppt/slides/slide15.xml><?xml version="1.0" encoding="utf-8"?>
+<p:sld xmlns:a="http://schemas.openxmlformats.org/drawingml/2006/main" xmlns:r="http://schemas.openxmlformats.org/officeDocument/2006/relationships" xmlns:p="http://schemas.openxmlformats.org/presentationml/2006/main">
+  <p:cSld>
+    <p:spTree>
+      <p:nvGrpSpPr>
+        <p:cNvPr id="1" name=""/>
+        <p:cNvGrpSpPr/>
+        <p:nvPr/>
+      </p:nvGrpSpPr>
+      <p:grpSpPr>
+        <a:xfrm>
+          <a:off x="0" y="0"/>
+          <a:ext cx="0" cy="0"/>
+          <a:chOff x="0" y="0"/>
+          <a:chExt cx="0" cy="0"/>
+        </a:xfrm>
+      </p:grpSpPr>
+      <p:sp>
+        <p:nvSpPr>
+          <p:cNvPr id="4" name="Text Placeholder 3"/>
+          <p:cNvSpPr>
+            <a:spLocks noGrp="1"/>
+          </p:cNvSpPr>
+          <p:nvPr>
+            <p:ph idx="2" sz="half" type="body"/>
+          </p:nvPr>
+        </p:nvSpPr>
+        <p:spPr/>
+        <p:txBody>
+          <a:bodyPr/>
+          <a:lstStyle/>
+          <a:p>
+            <a:pPr lvl="0" indent="0" marL="0">
+              <a:buNone/>
+            </a:pPr>
+            <a:r>
+              <a:rPr/>
+              <a:t>Es un fondo nuevo, pero vemos lo que hace. Nosotros fuimos los primeros inversores.</a:t>
+            </a:r>
+          </a:p>
+          <a:p>
+            <a:pPr lvl="0" indent="0" marL="0">
+              <a:spcBef>
+                <a:spcPts val="3000"/>
+              </a:spcBef>
+              <a:buNone/>
+            </a:pPr>
+            <a:r>
+              <a:rPr b="1"/>
+              <a:t>Crabel mantiene su perfil de volatilidad</a:t>
+            </a:r>
+          </a:p>
+        </p:txBody>
+      </p:sp>
+      <p:pic>
+        <p:nvPicPr>
+          <p:cNvPr descr="images/Crabel%20Advanced%20Trend%20Volatility.png" id="0" name="Picture 1"/>
+          <p:cNvPicPr>
+            <a:picLocks noGrp="1" noChangeAspect="1"/>
+          </p:cNvPicPr>
+          <p:nvPr/>
+        </p:nvPicPr>
+        <p:blipFill>
+          <a:blip r:embed="rId2"/>
+          <a:stretch>
+            <a:fillRect/>
+          </a:stretch>
+        </p:blipFill>
+        <p:spPr bwMode="auto">
+          <a:xfrm>
+            <a:off x="3568700" y="635000"/>
+            <a:ext cx="5105400" cy="3505200"/>
+          </a:xfrm>
+          <a:prstGeom prst="rect">
+            <a:avLst/>
+          </a:prstGeom>
+          <a:noFill/>
+          <a:ln w="9525">
+            <a:noFill/>
+            <a:headEnd/>
+            <a:tailEnd/>
+          </a:ln>
+        </p:spPr>
+      </p:pic>
+    </p:spTree>
+  </p:cSld>
+</p:sld>
+</file>
+
+<file path=ppt/slides/slide16.xml><?xml version="1.0" encoding="utf-8"?>
+<p:sld xmlns:a="http://schemas.openxmlformats.org/drawingml/2006/main" xmlns:r="http://schemas.openxmlformats.org/officeDocument/2006/relationships" xmlns:p="http://schemas.openxmlformats.org/presentationml/2006/main">
+  <p:cSld>
+    <p:spTree>
+      <p:nvGrpSpPr>
+        <p:cNvPr id="1" name=""/>
+        <p:cNvGrpSpPr/>
+        <p:nvPr/>
+      </p:nvGrpSpPr>
+      <p:grpSpPr>
+        <a:xfrm>
+          <a:off x="0" y="0"/>
+          <a:ext cx="0" cy="0"/>
+          <a:chOff x="0" y="0"/>
+          <a:chExt cx="0" cy="0"/>
+        </a:xfrm>
+      </p:grpSpPr>
+      <p:sp>
+        <p:nvSpPr>
+          <p:cNvPr id="4" name="Text Placeholder 3"/>
+          <p:cNvSpPr>
+            <a:spLocks noGrp="1"/>
+          </p:cNvSpPr>
+          <p:nvPr>
+            <p:ph idx="2" sz="half" type="body"/>
+          </p:nvPr>
+        </p:nvSpPr>
+        <p:spPr/>
+        <p:txBody>
+          <a:bodyPr/>
+          <a:lstStyle/>
+          <a:p>
+            <a:pPr lvl="0" indent="0" marL="0">
+              <a:spcBef>
+                <a:spcPts val="3000"/>
+              </a:spcBef>
+              <a:buNone/>
+            </a:pPr>
+            <a:r>
+              <a:rPr b="1"/>
+              <a:t>Winton cambió el fondo</a:t>
+            </a:r>
+          </a:p>
+        </p:txBody>
+      </p:sp>
+      <p:pic>
+        <p:nvPicPr>
+          <p:cNvPr descr="powerpoint-output_files/figure-pptx/unnamed-chunk-4-1.png" id="0" name="Picture 1"/>
+          <p:cNvPicPr>
+            <a:picLocks noGrp="1" noChangeAspect="1"/>
+          </p:cNvPicPr>
+          <p:nvPr/>
+        </p:nvPicPr>
+        <p:blipFill>
+          <a:blip r:embed="rId2"/>
+          <a:stretch>
+            <a:fillRect/>
+          </a:stretch>
+        </p:blipFill>
+        <p:spPr bwMode="auto">
+          <a:xfrm>
+            <a:off x="3568700" y="1117600"/>
+            <a:ext cx="5105400" cy="2552700"/>
+          </a:xfrm>
+          <a:prstGeom prst="rect">
+            <a:avLst/>
+          </a:prstGeom>
+          <a:noFill/>
+          <a:ln w="9525">
+            <a:noFill/>
+            <a:headEnd/>
+            <a:tailEnd/>
+          </a:ln>
+        </p:spPr>
+      </p:pic>
+    </p:spTree>
+  </p:cSld>
+</p:sld>
+</file>
+
+<file path=ppt/slides/slide17.xml><?xml version="1.0" encoding="utf-8"?>
+<p:sld xmlns:a="http://schemas.openxmlformats.org/drawingml/2006/main" xmlns:r="http://schemas.openxmlformats.org/officeDocument/2006/relationships" xmlns:p="http://schemas.openxmlformats.org/presentationml/2006/main">
+  <p:cSld>
+    <p:spTree>
+      <p:nvGrpSpPr>
+        <p:cNvPr id="1" name=""/>
+        <p:cNvGrpSpPr/>
+        <p:nvPr/>
+      </p:nvGrpSpPr>
+      <p:grpSpPr>
+        <a:xfrm>
+          <a:off x="0" y="0"/>
+          <a:ext cx="0" cy="0"/>
+          <a:chOff x="0" y="0"/>
+          <a:chExt cx="0" cy="0"/>
+        </a:xfrm>
+      </p:grpSpPr>
     </p:spTree>
   </p:cSld>
 </p:sld>

</xml_diff>

<commit_message>
Fixed stacked attribution chart
Also added many cases.
</commit_message>
<xml_diff>
--- a/presentations/powerpoint output.pptx
+++ b/presentations/powerpoint output.pptx
@@ -22,6 +22,21 @@
     <p:sldId id="270" r:id="rId16"/>
     <p:sldId id="271" r:id="rId17"/>
     <p:sldId id="272" r:id="rId18"/>
+    <p:sldId id="273" r:id="rId19"/>
+    <p:sldId id="274" r:id="rId20"/>
+    <p:sldId id="275" r:id="rId21"/>
+    <p:sldId id="276" r:id="rId22"/>
+    <p:sldId id="277" r:id="rId23"/>
+    <p:sldId id="278" r:id="rId24"/>
+    <p:sldId id="279" r:id="rId25"/>
+    <p:sldId id="280" r:id="rId26"/>
+    <p:sldId id="281" r:id="rId27"/>
+    <p:sldId id="282" r:id="rId28"/>
+    <p:sldId id="283" r:id="rId29"/>
+    <p:sldId id="284" r:id="rId30"/>
+    <p:sldId id="285" r:id="rId31"/>
+    <p:sldId id="286" r:id="rId32"/>
+    <p:sldId id="287" r:id="rId33"/>
   </p:sldIdLst>
   <p:sldSz cx="9144000" cy="5143500" type="screen16x9"/>
   <p:notesSz cx="6858000" cy="9144000"/>
@@ -3188,12 +3203,12 @@
       </p:grpSpPr>
       <p:sp>
         <p:nvSpPr>
-          <p:cNvPr id="4" name="Text Placeholder 3"/>
-          <p:cNvSpPr>
-            <a:spLocks noGrp="1"/>
-          </p:cNvSpPr>
-          <p:nvPr>
-            <p:ph idx="2" sz="half" type="body"/>
+          <p:cNvPr id="2" name="Title 1"/>
+          <p:cNvSpPr>
+            <a:spLocks noGrp="1"/>
+          </p:cNvSpPr>
+          <p:nvPr>
+            <p:ph type="title"/>
           </p:nvPr>
         </p:nvSpPr>
         <p:spPr/>
@@ -3202,42 +3217,18 @@
           <a:lstStyle/>
           <a:p>
             <a:pPr lvl="0" indent="0" marL="0">
-              <a:spcBef>
-                <a:spcPts val="3000"/>
-              </a:spcBef>
               <a:buNone/>
             </a:pPr>
             <a:r>
-              <a:rPr b="1"/>
-              <a:t>Equilibrio entre management fee y performance fee</a:t>
-            </a:r>
-          </a:p>
-          <a:p>
-            <a:pPr lvl="0" indent="0" marL="0">
-              <a:buNone/>
-            </a:pPr>
-            <a:r>
-              <a:rPr/>
-              <a:t>[mostrar el efecto de un management fee alto]</a:t>
-            </a:r>
-          </a:p>
-          <a:p>
-            <a:pPr lvl="0" indent="0" marL="0">
-              <a:spcBef>
-                <a:spcPts val="3000"/>
-              </a:spcBef>
-              <a:buNone/>
-            </a:pPr>
-            <a:r>
-              <a:rPr b="1"/>
-              <a:t>Riesgo de negocio en managers ‘Vieja Escuela’</a:t>
+              <a:rPr/>
+              <a:t>Contribución al portafolio</a:t>
             </a:r>
           </a:p>
         </p:txBody>
       </p:sp>
       <p:pic>
         <p:nvPicPr>
-          <p:cNvPr descr="powerpoint-output_files/figure-pptx/unnamed-chunk-2-1.png" id="0" name="Picture 1"/>
+          <p:cNvPr descr="images/contribucio%CC%81n%20al%20benchmark.png" id="0" name="Picture 1"/>
           <p:cNvPicPr>
             <a:picLocks noGrp="1" noChangeAspect="1"/>
           </p:cNvPicPr>
@@ -3251,8 +3242,8 @@
         </p:blipFill>
         <p:spPr bwMode="auto">
           <a:xfrm>
-            <a:off x="3568700" y="1117600"/>
-            <a:ext cx="5105400" cy="2552700"/>
+            <a:off x="2044700" y="1193800"/>
+            <a:ext cx="5054600" cy="3390900"/>
           </a:xfrm>
           <a:prstGeom prst="rect">
             <a:avLst/>
@@ -3289,12 +3280,12 @@
       </p:grpSpPr>
       <p:sp>
         <p:nvSpPr>
-          <p:cNvPr id="4" name="Text Placeholder 3"/>
-          <p:cNvSpPr>
-            <a:spLocks noGrp="1"/>
-          </p:cNvSpPr>
-          <p:nvPr>
-            <p:ph idx="2" sz="half" type="body"/>
+          <p:cNvPr id="2" name="Title 1"/>
+          <p:cNvSpPr>
+            <a:spLocks noGrp="1"/>
+          </p:cNvSpPr>
+          <p:nvPr>
+            <p:ph type="title"/>
           </p:nvPr>
         </p:nvSpPr>
         <p:spPr/>
@@ -3307,125 +3298,62 @@
             </a:pPr>
             <a:r>
               <a:rPr/>
-              <a:t>Los fondos más volátiles pierden muchos activos en momentos de caída.</a:t>
-            </a:r>
-          </a:p>
-          <a:p>
-            <a:pPr lvl="0" indent="0" marL="0">
-              <a:spcBef>
-                <a:spcPts val="3000"/>
-              </a:spcBef>
-              <a:buNone/>
-            </a:pPr>
-            <a:r>
-              <a:rPr b="1"/>
-              <a:t>Riesgo de negocio: efecto en el retorno ($100)</a:t>
-            </a:r>
-          </a:p>
+              <a:t>Características de un buen trend follower</a:t>
+            </a:r>
+          </a:p>
+        </p:txBody>
+      </p:sp>
+      <p:sp>
+        <p:nvSpPr>
+          <p:cNvPr id="3" name="Content Placeholder 2"/>
+          <p:cNvSpPr>
+            <a:spLocks noGrp="1"/>
+          </p:cNvSpPr>
+          <p:nvPr>
+            <p:ph idx="1"/>
+          </p:nvPr>
+        </p:nvSpPr>
+        <p:spPr/>
+        <p:txBody>
+          <a:bodyPr/>
+          <a:lstStyle/>
           <a:p>
             <a:pPr lvl="0"/>
             <a:r>
               <a:rPr/>
-              <a:t>ESCENARIO A: Mismo manager</a:t>
-            </a:r>
-          </a:p>
-          <a:p>
-            <a:pPr lvl="1"/>
-            <a:r>
-              <a:rPr/>
-              <a:t>Resultado de -$20 + Resultado de +$20 = $100</a:t>
+              <a:t>Tiene un programa activo, con un mínimo de inversión bajo.</a:t>
             </a:r>
           </a:p>
           <a:p>
             <a:pPr lvl="0"/>
             <a:r>
               <a:rPr/>
-              <a:t>ESCENARIO B: Cambio de manager</a:t>
-            </a:r>
-          </a:p>
-          <a:p>
-            <a:pPr lvl="1"/>
-            <a:r>
-              <a:rPr/>
-              <a:t>Resultado de -$20 -&gt;</a:t>
-            </a:r>
-          </a:p>
-          <a:p>
-            <a:pPr lvl="1"/>
-            <a:r>
-              <a:rPr/>
-              <a:t>Cambio de manager</a:t>
-            </a:r>
-          </a:p>
-          <a:p>
-            <a:pPr lvl="1"/>
-            <a:r>
-              <a:rPr/>
-              <a:t>Resultado de +20 - success fee de $4 nuevo manager = $96</a:t>
-            </a:r>
-          </a:p>
-          <a:p>
-            <a:pPr lvl="0" indent="0" marL="0">
-              <a:buNone/>
-            </a:pPr>
-            <a:r>
-              <a:rPr/>
-              <a:t>Supone un success fee del 20%.</a:t>
-            </a:r>
-          </a:p>
-          <a:p>
-            <a:pPr lvl="0" indent="0" marL="0">
-              <a:buNone/>
-            </a:pPr>
-            <a:r>
-              <a:rPr/>
-              <a:t>Al cambiar de manager se pierde el ‘high watermark’.</a:t>
-            </a:r>
-          </a:p>
-          <a:p>
-            <a:pPr lvl="0" indent="0" marL="0">
-              <a:spcBef>
-                <a:spcPts val="3000"/>
-              </a:spcBef>
-              <a:buNone/>
-            </a:pPr>
-            <a:r>
-              <a:rPr b="1"/>
-              <a:t>Riesgo de negocio y High Watermark</a:t>
-            </a:r>
-          </a:p>
-        </p:txBody>
-      </p:sp>
-      <p:pic>
-        <p:nvPicPr>
-          <p:cNvPr descr="images/high%20watermark.png" id="0" name="Picture 1"/>
-          <p:cNvPicPr>
-            <a:picLocks noGrp="1" noChangeAspect="1"/>
-          </p:cNvPicPr>
-          <p:nvPr/>
-        </p:nvPicPr>
-        <p:blipFill>
-          <a:blip r:embed="rId2"/>
-          <a:stretch>
-            <a:fillRect/>
-          </a:stretch>
-        </p:blipFill>
-        <p:spPr bwMode="auto">
-          <a:xfrm>
-            <a:off x="3568700" y="1104900"/>
-            <a:ext cx="5105400" cy="2578100"/>
-          </a:xfrm>
-          <a:prstGeom prst="rect">
-            <a:avLst/>
-          </a:prstGeom>
-          <a:noFill/>
-          <a:ln w="9525">
-            <a:noFill/>
-            <a:headEnd/>
-            <a:tailEnd/>
-          </a:ln>
-        </p:spPr>
-      </p:pic>
+              <a:t>Tiene al menos 15 años de historia.</a:t>
+            </a:r>
+          </a:p>
+          <a:p>
+            <a:pPr lvl="0"/>
+            <a:r>
+              <a:rPr/>
+              <a:t>Trend Following es la estrategia dominante de su programa.</a:t>
+            </a:r>
+          </a:p>
+          <a:p>
+            <a:pPr lvl="0"/>
+            <a:r>
+              <a:rPr/>
+              <a:t>Es totalmente sistemático y usa reglas cuantitativas para entrar y salir de posiciones.</a:t>
+            </a:r>
+          </a:p>
+          <a:p>
+            <a:pPr lvl="0"/>
+            <a:r>
+              <a:rPr/>
+              <a:t>Está globalmente diversificado e invierte en una amplia selección de clases de activos.</a:t>
+            </a:r>
+          </a:p>
+        </p:txBody>
+      </p:sp>
     </p:spTree>
   </p:cSld>
 </p:sld>
@@ -3450,12 +3378,12 @@
       </p:grpSpPr>
       <p:sp>
         <p:nvSpPr>
-          <p:cNvPr id="3" name="Content Placeholder 2"/>
-          <p:cNvSpPr>
-            <a:spLocks noGrp="1"/>
-          </p:cNvSpPr>
-          <p:nvPr>
-            <p:ph idx="1"/>
+          <p:cNvPr id="2" name="Title 1"/>
+          <p:cNvSpPr>
+            <a:spLocks noGrp="1"/>
+          </p:cNvSpPr>
+          <p:nvPr>
+            <p:ph type="title"/>
           </p:nvPr>
         </p:nvSpPr>
         <p:spPr/>
@@ -3468,41 +3396,1080 @@
             </a:pPr>
             <a:r>
               <a:rPr/>
-              <a:t>Asumiendo un performance fee de 20%</a:t>
-            </a:r>
-          </a:p>
-          <a:p>
-            <a:pPr lvl="0" indent="0" marL="0">
-              <a:spcBef>
-                <a:spcPts val="3000"/>
-              </a:spcBef>
-              <a:buNone/>
-            </a:pPr>
-            <a:r>
-              <a:rPr b="1"/>
-              <a:t>Efectos del benchmark</a:t>
-            </a:r>
-          </a:p>
-          <a:p>
-            <a:pPr lvl="0" indent="0" marL="0">
-              <a:spcBef>
-                <a:spcPts val="3000"/>
-              </a:spcBef>
-              <a:buNone/>
-            </a:pPr>
-            <a:r>
-              <a:rPr b="1"/>
-              <a:t>Efectos de trend following</a:t>
-            </a:r>
-          </a:p>
-        </p:txBody>
-      </p:sp>
+              <a:t>Buenos Trend Followers</a:t>
+            </a:r>
+          </a:p>
+        </p:txBody>
+      </p:sp>
+      <p:pic>
+        <p:nvPicPr>
+          <p:cNvPr descr="images/top%20funds%20by%20mar%2015%20years.png" id="0" name="Picture 1"/>
+          <p:cNvPicPr>
+            <a:picLocks noGrp="1" noChangeAspect="1"/>
+          </p:cNvPicPr>
+          <p:nvPr/>
+        </p:nvPicPr>
+        <p:blipFill>
+          <a:blip r:embed="rId2"/>
+          <a:stretch>
+            <a:fillRect/>
+          </a:stretch>
+        </p:blipFill>
+        <p:spPr bwMode="auto">
+          <a:xfrm>
+            <a:off x="457200" y="1447800"/>
+            <a:ext cx="8229600" cy="2882900"/>
+          </a:xfrm>
+          <a:prstGeom prst="rect">
+            <a:avLst/>
+          </a:prstGeom>
+          <a:noFill/>
+          <a:ln w="9525">
+            <a:noFill/>
+            <a:headEnd/>
+            <a:tailEnd/>
+          </a:ln>
+        </p:spPr>
+      </p:pic>
     </p:spTree>
   </p:cSld>
 </p:sld>
 </file>
 
 <file path=ppt/slides/slide13.xml><?xml version="1.0" encoding="utf-8"?>
+<p:sld xmlns:a="http://schemas.openxmlformats.org/drawingml/2006/main" xmlns:r="http://schemas.openxmlformats.org/officeDocument/2006/relationships" xmlns:p="http://schemas.openxmlformats.org/presentationml/2006/main">
+  <p:cSld>
+    <p:spTree>
+      <p:nvGrpSpPr>
+        <p:cNvPr id="1" name=""/>
+        <p:cNvGrpSpPr/>
+        <p:nvPr/>
+      </p:nvGrpSpPr>
+      <p:grpSpPr>
+        <a:xfrm>
+          <a:off x="0" y="0"/>
+          <a:ext cx="0" cy="0"/>
+          <a:chOff x="0" y="0"/>
+          <a:chExt cx="0" cy="0"/>
+        </a:xfrm>
+      </p:grpSpPr>
+      <p:sp>
+        <p:nvSpPr>
+          <p:cNvPr id="3" name="Content Placeholder 2"/>
+          <p:cNvSpPr>
+            <a:spLocks noGrp="1"/>
+          </p:cNvSpPr>
+          <p:nvPr>
+            <p:ph idx="1"/>
+          </p:nvPr>
+        </p:nvSpPr>
+        <p:spPr/>
+        <p:txBody>
+          <a:bodyPr/>
+          <a:lstStyle/>
+          <a:p>
+            <a:pPr lvl="0" indent="0" marL="0">
+              <a:buNone/>
+            </a:pPr>
+            <a:r>
+              <a:rPr/>
+              <a:t>Estos fondos tenían 15 años de track record en el año 2000. Para cada año muestra el ranking de los 5 mejores fondos por ratio MAR.</a:t>
+            </a:r>
+          </a:p>
+        </p:txBody>
+      </p:sp>
+    </p:spTree>
+  </p:cSld>
+</p:sld>
+</file>
+
+<file path=ppt/slides/slide14.xml><?xml version="1.0" encoding="utf-8"?>
+<p:sld xmlns:a="http://schemas.openxmlformats.org/drawingml/2006/main" xmlns:r="http://schemas.openxmlformats.org/officeDocument/2006/relationships" xmlns:p="http://schemas.openxmlformats.org/presentationml/2006/main">
+  <p:cSld>
+    <p:spTree>
+      <p:nvGrpSpPr>
+        <p:cNvPr id="1" name=""/>
+        <p:cNvGrpSpPr/>
+        <p:nvPr/>
+      </p:nvGrpSpPr>
+      <p:grpSpPr>
+        <a:xfrm>
+          <a:off x="0" y="0"/>
+          <a:ext cx="0" cy="0"/>
+          <a:chOff x="0" y="0"/>
+          <a:chExt cx="0" cy="0"/>
+        </a:xfrm>
+      </p:grpSpPr>
+      <p:sp>
+        <p:nvSpPr>
+          <p:cNvPr id="2" name="Title 1"/>
+          <p:cNvSpPr>
+            <a:spLocks noGrp="1"/>
+          </p:cNvSpPr>
+          <p:nvPr>
+            <p:ph type="title"/>
+          </p:nvPr>
+        </p:nvSpPr>
+        <p:spPr/>
+        <p:txBody>
+          <a:bodyPr/>
+          <a:lstStyle/>
+          <a:p>
+            <a:pPr lvl="0" indent="0" marL="0">
+              <a:buNone/>
+            </a:pPr>
+            <a:r>
+              <a:rPr/>
+              <a:t>Fondos vieja escuela</a:t>
+            </a:r>
+          </a:p>
+        </p:txBody>
+      </p:sp>
+      <p:sp>
+        <p:nvSpPr>
+          <p:cNvPr id="3" name="Content Placeholder 2"/>
+          <p:cNvSpPr>
+            <a:spLocks noGrp="1"/>
+          </p:cNvSpPr>
+          <p:nvPr>
+            <p:ph idx="1"/>
+          </p:nvPr>
+        </p:nvSpPr>
+        <p:spPr/>
+        <p:txBody>
+          <a:bodyPr/>
+          <a:lstStyle/>
+          <a:p>
+            <a:pPr lvl="0" indent="0" marL="0">
+              <a:buNone/>
+            </a:pPr>
+            <a:r>
+              <a:rPr/>
+              <a:t>Vieja escuela:</a:t>
+            </a:r>
+          </a:p>
+          <a:p>
+            <a:pPr lvl="0"/>
+            <a:r>
+              <a:rPr/>
+              <a:t>Ejecutan la estrategia en forma pura.</a:t>
+            </a:r>
+          </a:p>
+          <a:p>
+            <a:pPr lvl="0"/>
+            <a:r>
+              <a:rPr/>
+              <a:t>Tienen grandes movimientos.</a:t>
+            </a:r>
+          </a:p>
+          <a:p>
+            <a:pPr lvl="0"/>
+            <a:r>
+              <a:rPr/>
+              <a:t>Se diferencian en el corto plazo.</a:t>
+            </a:r>
+          </a:p>
+          <a:p>
+            <a:pPr lvl="0"/>
+            <a:r>
+              <a:rPr/>
+              <a:t>Pueden tener riesgo key-person.</a:t>
+            </a:r>
+          </a:p>
+        </p:txBody>
+      </p:sp>
+    </p:spTree>
+  </p:cSld>
+</p:sld>
+</file>
+
+<file path=ppt/slides/slide15.xml><?xml version="1.0" encoding="utf-8"?>
+<p:sld xmlns:a="http://schemas.openxmlformats.org/drawingml/2006/main" xmlns:r="http://schemas.openxmlformats.org/officeDocument/2006/relationships" xmlns:p="http://schemas.openxmlformats.org/presentationml/2006/main">
+  <p:cSld>
+    <p:spTree>
+      <p:nvGrpSpPr>
+        <p:cNvPr id="1" name=""/>
+        <p:cNvGrpSpPr/>
+        <p:nvPr/>
+      </p:nvGrpSpPr>
+      <p:grpSpPr>
+        <a:xfrm>
+          <a:off x="0" y="0"/>
+          <a:ext cx="0" cy="0"/>
+          <a:chOff x="0" y="0"/>
+          <a:chExt cx="0" cy="0"/>
+        </a:xfrm>
+      </p:grpSpPr>
+      <p:sp>
+        <p:nvSpPr>
+          <p:cNvPr id="2" name="Title 1"/>
+          <p:cNvSpPr>
+            <a:spLocks noGrp="1"/>
+          </p:cNvSpPr>
+          <p:nvPr>
+            <p:ph type="title"/>
+          </p:nvPr>
+        </p:nvSpPr>
+        <p:spPr/>
+        <p:txBody>
+          <a:bodyPr/>
+          <a:lstStyle/>
+          <a:p>
+            <a:pPr lvl="0" indent="0" marL="0">
+              <a:buNone/>
+            </a:pPr>
+            <a:r>
+              <a:rPr/>
+              <a:t>Fondos institucionales</a:t>
+            </a:r>
+          </a:p>
+        </p:txBody>
+      </p:sp>
+      <p:sp>
+        <p:nvSpPr>
+          <p:cNvPr id="3" name="Content Placeholder 2"/>
+          <p:cNvSpPr>
+            <a:spLocks noGrp="1"/>
+          </p:cNvSpPr>
+          <p:nvPr>
+            <p:ph idx="1"/>
+          </p:nvPr>
+        </p:nvSpPr>
+        <p:spPr/>
+        <p:txBody>
+          <a:bodyPr/>
+          <a:lstStyle/>
+          <a:p>
+            <a:pPr lvl="0"/>
+            <a:r>
+              <a:rPr/>
+              <a:t>Son más predecibles</a:t>
+            </a:r>
+          </a:p>
+          <a:p>
+            <a:pPr lvl="0"/>
+            <a:r>
+              <a:rPr/>
+              <a:t>Se mueven menos</a:t>
+            </a:r>
+          </a:p>
+          <a:p>
+            <a:pPr lvl="0"/>
+            <a:r>
+              <a:rPr/>
+              <a:t>A veces se ‘quedan atrás’</a:t>
+            </a:r>
+          </a:p>
+          <a:p>
+            <a:pPr lvl="0"/>
+            <a:r>
+              <a:rPr/>
+              <a:t>La continuidad de negocio es más segura</a:t>
+            </a:r>
+          </a:p>
+        </p:txBody>
+      </p:sp>
+    </p:spTree>
+  </p:cSld>
+</p:sld>
+</file>
+
+<file path=ppt/slides/slide16.xml><?xml version="1.0" encoding="utf-8"?>
+<p:sld xmlns:a="http://schemas.openxmlformats.org/drawingml/2006/main" xmlns:r="http://schemas.openxmlformats.org/officeDocument/2006/relationships" xmlns:p="http://schemas.openxmlformats.org/presentationml/2006/main">
+  <p:cSld>
+    <p:spTree>
+      <p:nvGrpSpPr>
+        <p:cNvPr id="1" name=""/>
+        <p:cNvGrpSpPr/>
+        <p:nvPr/>
+      </p:nvGrpSpPr>
+      <p:grpSpPr>
+        <a:xfrm>
+          <a:off x="0" y="0"/>
+          <a:ext cx="0" cy="0"/>
+          <a:chOff x="0" y="0"/>
+          <a:chExt cx="0" cy="0"/>
+        </a:xfrm>
+      </p:grpSpPr>
+      <p:sp>
+        <p:nvSpPr>
+          <p:cNvPr id="2" name="Title 1"/>
+          <p:cNvSpPr>
+            <a:spLocks noGrp="1"/>
+          </p:cNvSpPr>
+          <p:nvPr>
+            <p:ph type="title"/>
+          </p:nvPr>
+        </p:nvSpPr>
+        <p:spPr>
+          <a:xfrm>
+            <a:off x="457201" y="204787"/>
+            <a:ext cx="3008313" cy="871538"/>
+          </a:xfrm>
+        </p:spPr>
+        <p:txBody>
+          <a:bodyPr/>
+          <a:lstStyle/>
+          <a:p>
+            <a:pPr lvl="0" indent="0" marL="0">
+              <a:buNone/>
+            </a:pPr>
+            <a:r>
+              <a:rPr/>
+              <a:t>Managers grandes: negocio</a:t>
+            </a:r>
+          </a:p>
+        </p:txBody>
+      </p:sp>
+      <p:sp>
+        <p:nvSpPr>
+          <p:cNvPr id="4" name="Text Placeholder 3"/>
+          <p:cNvSpPr>
+            <a:spLocks noGrp="1"/>
+          </p:cNvSpPr>
+          <p:nvPr>
+            <p:ph idx="2" sz="half" type="body"/>
+          </p:nvPr>
+        </p:nvSpPr>
+        <p:spPr/>
+        <p:txBody>
+          <a:bodyPr/>
+          <a:lstStyle/>
+          <a:p>
+            <a:pPr lvl="0" indent="0" marL="0">
+              <a:buNone/>
+            </a:pPr>
+            <a:r>
+              <a:rPr/>
+              <a:t>Sobre un total de $140 billones de dólares</a:t>
+            </a:r>
+          </a:p>
+        </p:txBody>
+      </p:sp>
+      <p:pic>
+        <p:nvPicPr>
+          <p:cNvPr descr="images/managers%20grandes.png" id="0" name="Picture 1"/>
+          <p:cNvPicPr>
+            <a:picLocks noGrp="1" noChangeAspect="1"/>
+          </p:cNvPicPr>
+          <p:nvPr/>
+        </p:nvPicPr>
+        <p:blipFill>
+          <a:blip r:embed="rId2"/>
+          <a:stretch>
+            <a:fillRect/>
+          </a:stretch>
+        </p:blipFill>
+        <p:spPr bwMode="auto">
+          <a:xfrm>
+            <a:off x="3568700" y="1333500"/>
+            <a:ext cx="5105400" cy="2120900"/>
+          </a:xfrm>
+          <a:prstGeom prst="rect">
+            <a:avLst/>
+          </a:prstGeom>
+          <a:noFill/>
+          <a:ln w="9525">
+            <a:noFill/>
+            <a:headEnd/>
+            <a:tailEnd/>
+          </a:ln>
+        </p:spPr>
+      </p:pic>
+    </p:spTree>
+  </p:cSld>
+</p:sld>
+</file>
+
+<file path=ppt/slides/slide17.xml><?xml version="1.0" encoding="utf-8"?>
+<p:sld xmlns:a="http://schemas.openxmlformats.org/drawingml/2006/main" xmlns:r="http://schemas.openxmlformats.org/officeDocument/2006/relationships" xmlns:p="http://schemas.openxmlformats.org/presentationml/2006/main">
+  <p:cSld>
+    <p:spTree>
+      <p:nvGrpSpPr>
+        <p:cNvPr id="1" name=""/>
+        <p:cNvGrpSpPr/>
+        <p:nvPr/>
+      </p:nvGrpSpPr>
+      <p:grpSpPr>
+        <a:xfrm>
+          <a:off x="0" y="0"/>
+          <a:ext cx="0" cy="0"/>
+          <a:chOff x="0" y="0"/>
+          <a:chExt cx="0" cy="0"/>
+        </a:xfrm>
+      </p:grpSpPr>
+      <p:sp>
+        <p:nvSpPr>
+          <p:cNvPr id="2" name="Title 1"/>
+          <p:cNvSpPr>
+            <a:spLocks noGrp="1"/>
+          </p:cNvSpPr>
+          <p:nvPr>
+            <p:ph type="title"/>
+          </p:nvPr>
+        </p:nvSpPr>
+        <p:spPr/>
+        <p:txBody>
+          <a:bodyPr/>
+          <a:lstStyle/>
+          <a:p>
+            <a:pPr lvl="0" indent="0" marL="0">
+              <a:buNone/>
+            </a:pPr>
+            <a:r>
+              <a:rPr/>
+              <a:t>Managers grandes: sus fondos</a:t>
+            </a:r>
+          </a:p>
+        </p:txBody>
+      </p:sp>
+      <p:pic>
+        <p:nvPicPr>
+          <p:cNvPr descr="images/big%20managers.png" id="0" name="Picture 1"/>
+          <p:cNvPicPr>
+            <a:picLocks noGrp="1" noChangeAspect="1"/>
+          </p:cNvPicPr>
+          <p:nvPr/>
+        </p:nvPicPr>
+        <p:blipFill>
+          <a:blip r:embed="rId2"/>
+          <a:stretch>
+            <a:fillRect/>
+          </a:stretch>
+        </p:blipFill>
+        <p:spPr bwMode="auto">
+          <a:xfrm>
+            <a:off x="2006600" y="1193800"/>
+            <a:ext cx="5130800" cy="3390900"/>
+          </a:xfrm>
+          <a:prstGeom prst="rect">
+            <a:avLst/>
+          </a:prstGeom>
+          <a:noFill/>
+          <a:ln w="9525">
+            <a:noFill/>
+            <a:headEnd/>
+            <a:tailEnd/>
+          </a:ln>
+        </p:spPr>
+      </p:pic>
+    </p:spTree>
+  </p:cSld>
+</p:sld>
+</file>
+
+<file path=ppt/slides/slide18.xml><?xml version="1.0" encoding="utf-8"?>
+<p:sld xmlns:a="http://schemas.openxmlformats.org/drawingml/2006/main" xmlns:r="http://schemas.openxmlformats.org/officeDocument/2006/relationships" xmlns:p="http://schemas.openxmlformats.org/presentationml/2006/main">
+  <p:cSld>
+    <p:spTree>
+      <p:nvGrpSpPr>
+        <p:cNvPr id="1" name=""/>
+        <p:cNvGrpSpPr/>
+        <p:nvPr/>
+      </p:nvGrpSpPr>
+      <p:grpSpPr>
+        <a:xfrm>
+          <a:off x="0" y="0"/>
+          <a:ext cx="0" cy="0"/>
+          <a:chOff x="0" y="0"/>
+          <a:chExt cx="0" cy="0"/>
+        </a:xfrm>
+      </p:grpSpPr>
+      <p:sp>
+        <p:nvSpPr>
+          <p:cNvPr id="2" name="Title 1"/>
+          <p:cNvSpPr>
+            <a:spLocks noGrp="1"/>
+          </p:cNvSpPr>
+          <p:nvPr>
+            <p:ph type="title"/>
+          </p:nvPr>
+        </p:nvSpPr>
+        <p:spPr/>
+        <p:txBody>
+          <a:bodyPr/>
+          <a:lstStyle/>
+          <a:p>
+            <a:pPr lvl="0" indent="0" marL="0">
+              <a:buNone/>
+            </a:pPr>
+            <a:r>
+              <a:rPr/>
+              <a:t>Equilibrio entre management fee y performance fee</a:t>
+            </a:r>
+          </a:p>
+        </p:txBody>
+      </p:sp>
+      <p:sp>
+        <p:nvSpPr>
+          <p:cNvPr id="3" name="Content Placeholder 2"/>
+          <p:cNvSpPr>
+            <a:spLocks noGrp="1"/>
+          </p:cNvSpPr>
+          <p:nvPr>
+            <p:ph idx="1"/>
+          </p:nvPr>
+        </p:nvSpPr>
+        <p:spPr/>
+        <p:txBody>
+          <a:bodyPr/>
+          <a:lstStyle/>
+          <a:p>
+            <a:pPr lvl="0" indent="0" marL="0">
+              <a:buNone/>
+            </a:pPr>
+            <a:r>
+              <a:rPr/>
+              <a:t>[mostrar el efecto de un management fee alto]</a:t>
+            </a:r>
+          </a:p>
+        </p:txBody>
+      </p:sp>
+    </p:spTree>
+  </p:cSld>
+</p:sld>
+</file>
+
+<file path=ppt/slides/slide19.xml><?xml version="1.0" encoding="utf-8"?>
+<p:sld xmlns:a="http://schemas.openxmlformats.org/drawingml/2006/main" xmlns:r="http://schemas.openxmlformats.org/officeDocument/2006/relationships" xmlns:p="http://schemas.openxmlformats.org/presentationml/2006/main">
+  <p:cSld>
+    <p:spTree>
+      <p:nvGrpSpPr>
+        <p:cNvPr id="1" name=""/>
+        <p:cNvGrpSpPr/>
+        <p:nvPr/>
+      </p:nvGrpSpPr>
+      <p:grpSpPr>
+        <a:xfrm>
+          <a:off x="0" y="0"/>
+          <a:ext cx="0" cy="0"/>
+          <a:chOff x="0" y="0"/>
+          <a:chExt cx="0" cy="0"/>
+        </a:xfrm>
+      </p:grpSpPr>
+      <p:sp>
+        <p:nvSpPr>
+          <p:cNvPr id="2" name="Title 1"/>
+          <p:cNvSpPr>
+            <a:spLocks noGrp="1"/>
+          </p:cNvSpPr>
+          <p:nvPr>
+            <p:ph type="title"/>
+          </p:nvPr>
+        </p:nvSpPr>
+        <p:spPr/>
+        <p:txBody>
+          <a:bodyPr/>
+          <a:lstStyle/>
+          <a:p>
+            <a:pPr lvl="0" indent="0" marL="0">
+              <a:buNone/>
+            </a:pPr>
+            <a:r>
+              <a:rPr/>
+              <a:t>Riesgo de negocio en managers ‘Vieja Escuela’</a:t>
+            </a:r>
+          </a:p>
+        </p:txBody>
+      </p:sp>
+      <p:pic>
+        <p:nvPicPr>
+          <p:cNvPr descr="powerpoint-output_files/figure-pptx/unnamed-chunk-2-1.png" id="0" name="Picture 1"/>
+          <p:cNvPicPr>
+            <a:picLocks noGrp="1" noChangeAspect="1"/>
+          </p:cNvPicPr>
+          <p:nvPr/>
+        </p:nvPicPr>
+        <p:blipFill>
+          <a:blip r:embed="rId2"/>
+          <a:stretch>
+            <a:fillRect/>
+          </a:stretch>
+        </p:blipFill>
+        <p:spPr bwMode="auto">
+          <a:xfrm>
+            <a:off x="1181100" y="1193800"/>
+            <a:ext cx="6781800" cy="3390900"/>
+          </a:xfrm>
+          <a:prstGeom prst="rect">
+            <a:avLst/>
+          </a:prstGeom>
+          <a:noFill/>
+          <a:ln w="9525">
+            <a:noFill/>
+            <a:headEnd/>
+            <a:tailEnd/>
+          </a:ln>
+        </p:spPr>
+      </p:pic>
+    </p:spTree>
+  </p:cSld>
+</p:sld>
+</file>
+
+<file path=ppt/slides/slide2.xml><?xml version="1.0" encoding="utf-8"?>
+<p:sld xmlns:a="http://schemas.openxmlformats.org/drawingml/2006/main" xmlns:r="http://schemas.openxmlformats.org/officeDocument/2006/relationships" xmlns:p="http://schemas.openxmlformats.org/presentationml/2006/main">
+  <p:cSld>
+    <p:spTree>
+      <p:nvGrpSpPr>
+        <p:cNvPr id="1" name=""/>
+        <p:cNvGrpSpPr/>
+        <p:nvPr/>
+      </p:nvGrpSpPr>
+      <p:grpSpPr>
+        <a:xfrm>
+          <a:off x="0" y="0"/>
+          <a:ext cx="0" cy="0"/>
+          <a:chOff x="0" y="0"/>
+          <a:chExt cx="0" cy="0"/>
+        </a:xfrm>
+      </p:grpSpPr>
+      <p:sp>
+        <p:nvSpPr>
+          <p:cNvPr id="2" name="Title 1"/>
+          <p:cNvSpPr>
+            <a:spLocks noGrp="1"/>
+          </p:cNvSpPr>
+          <p:nvPr>
+            <p:ph type="title"/>
+          </p:nvPr>
+        </p:nvSpPr>
+        <p:spPr/>
+        <p:txBody>
+          <a:bodyPr/>
+          <a:lstStyle/>
+          <a:p>
+            <a:pPr lvl="0" indent="0" marL="0">
+              <a:buNone/>
+            </a:pPr>
+            <a:r>
+              <a:rPr/>
+              <a:t>Conclusiones</a:t>
+            </a:r>
+          </a:p>
+        </p:txBody>
+      </p:sp>
+      <p:sp>
+        <p:nvSpPr>
+          <p:cNvPr id="3" name="Content Placeholder 2"/>
+          <p:cNvSpPr>
+            <a:spLocks noGrp="1"/>
+          </p:cNvSpPr>
+          <p:nvPr>
+            <p:ph idx="1"/>
+          </p:nvPr>
+        </p:nvSpPr>
+        <p:spPr/>
+        <p:txBody>
+          <a:bodyPr/>
+          <a:lstStyle/>
+          <a:p>
+            <a:pPr lvl="0"/>
+            <a:r>
+              <a:rPr/>
+              <a:t>Trend Following mejora el retorno y el riesgo de un portafolio ‘buy and hold’.</a:t>
+            </a:r>
+          </a:p>
+          <a:p>
+            <a:pPr lvl="0"/>
+            <a:r>
+              <a:rPr/>
+              <a:t>La selección de un manager depende del objetivo: a) tener Trend Following o b) cubrir riesgos de accidente.</a:t>
+            </a:r>
+          </a:p>
+          <a:p>
+            <a:pPr lvl="0"/>
+            <a:r>
+              <a:rPr/>
+              <a:t>Hay dos tipos de managers: ‘vieja escuela’ e ‘institucionales’.</a:t>
+            </a:r>
+          </a:p>
+          <a:p>
+            <a:pPr lvl="0"/>
+            <a:r>
+              <a:rPr/>
+              <a:t>De acuerdo al tipo de manager es el porcentaje del portafolio a invertir.</a:t>
+            </a:r>
+          </a:p>
+        </p:txBody>
+      </p:sp>
+    </p:spTree>
+  </p:cSld>
+</p:sld>
+</file>
+
+<file path=ppt/slides/slide20.xml><?xml version="1.0" encoding="utf-8"?>
+<p:sld xmlns:a="http://schemas.openxmlformats.org/drawingml/2006/main" xmlns:r="http://schemas.openxmlformats.org/officeDocument/2006/relationships" xmlns:p="http://schemas.openxmlformats.org/presentationml/2006/main">
+  <p:cSld>
+    <p:spTree>
+      <p:nvGrpSpPr>
+        <p:cNvPr id="1" name=""/>
+        <p:cNvGrpSpPr/>
+        <p:nvPr/>
+      </p:nvGrpSpPr>
+      <p:grpSpPr>
+        <a:xfrm>
+          <a:off x="0" y="0"/>
+          <a:ext cx="0" cy="0"/>
+          <a:chOff x="0" y="0"/>
+          <a:chExt cx="0" cy="0"/>
+        </a:xfrm>
+      </p:grpSpPr>
+      <p:sp>
+        <p:nvSpPr>
+          <p:cNvPr id="3" name="Content Placeholder 2"/>
+          <p:cNvSpPr>
+            <a:spLocks noGrp="1"/>
+          </p:cNvSpPr>
+          <p:nvPr>
+            <p:ph idx="1"/>
+          </p:nvPr>
+        </p:nvSpPr>
+        <p:spPr/>
+        <p:txBody>
+          <a:bodyPr/>
+          <a:lstStyle/>
+          <a:p>
+            <a:pPr lvl="0" indent="0" marL="0">
+              <a:buNone/>
+            </a:pPr>
+            <a:r>
+              <a:rPr/>
+              <a:t>Los fondos más volátiles pierden muchos activos en momentos de caída.</a:t>
+            </a:r>
+          </a:p>
+        </p:txBody>
+      </p:sp>
+    </p:spTree>
+  </p:cSld>
+</p:sld>
+</file>
+
+<file path=ppt/slides/slide21.xml><?xml version="1.0" encoding="utf-8"?>
+<p:sld xmlns:a="http://schemas.openxmlformats.org/drawingml/2006/main" xmlns:r="http://schemas.openxmlformats.org/officeDocument/2006/relationships" xmlns:p="http://schemas.openxmlformats.org/presentationml/2006/main">
+  <p:cSld>
+    <p:spTree>
+      <p:nvGrpSpPr>
+        <p:cNvPr id="1" name=""/>
+        <p:cNvGrpSpPr/>
+        <p:nvPr/>
+      </p:nvGrpSpPr>
+      <p:grpSpPr>
+        <a:xfrm>
+          <a:off x="0" y="0"/>
+          <a:ext cx="0" cy="0"/>
+          <a:chOff x="0" y="0"/>
+          <a:chExt cx="0" cy="0"/>
+        </a:xfrm>
+      </p:grpSpPr>
+      <p:sp>
+        <p:nvSpPr>
+          <p:cNvPr id="2" name="Title 1"/>
+          <p:cNvSpPr>
+            <a:spLocks noGrp="1"/>
+          </p:cNvSpPr>
+          <p:nvPr>
+            <p:ph type="title"/>
+          </p:nvPr>
+        </p:nvSpPr>
+        <p:spPr/>
+        <p:txBody>
+          <a:bodyPr/>
+          <a:lstStyle/>
+          <a:p>
+            <a:pPr lvl="0" indent="0" marL="0">
+              <a:buNone/>
+            </a:pPr>
+            <a:r>
+              <a:rPr/>
+              <a:t>Riesgo de negocio: efecto en el retorno ($100)</a:t>
+            </a:r>
+          </a:p>
+        </p:txBody>
+      </p:sp>
+      <p:sp>
+        <p:nvSpPr>
+          <p:cNvPr id="3" name="Content Placeholder 2"/>
+          <p:cNvSpPr>
+            <a:spLocks noGrp="1"/>
+          </p:cNvSpPr>
+          <p:nvPr>
+            <p:ph idx="1"/>
+          </p:nvPr>
+        </p:nvSpPr>
+        <p:spPr/>
+        <p:txBody>
+          <a:bodyPr/>
+          <a:lstStyle/>
+          <a:p>
+            <a:pPr lvl="0"/>
+            <a:r>
+              <a:rPr/>
+              <a:t>ESCENARIO A: Mismo manager</a:t>
+            </a:r>
+          </a:p>
+          <a:p>
+            <a:pPr lvl="1"/>
+            <a:r>
+              <a:rPr/>
+              <a:t>Resultado de -$20 + Resultado de +$20 = $100</a:t>
+            </a:r>
+          </a:p>
+          <a:p>
+            <a:pPr lvl="0"/>
+            <a:r>
+              <a:rPr/>
+              <a:t>ESCENARIO B: Cambio de manager</a:t>
+            </a:r>
+          </a:p>
+          <a:p>
+            <a:pPr lvl="1"/>
+            <a:r>
+              <a:rPr/>
+              <a:t>Resultado de -$20 -&gt;</a:t>
+            </a:r>
+          </a:p>
+          <a:p>
+            <a:pPr lvl="1"/>
+            <a:r>
+              <a:rPr/>
+              <a:t>Cambio de manager</a:t>
+            </a:r>
+          </a:p>
+          <a:p>
+            <a:pPr lvl="1"/>
+            <a:r>
+              <a:rPr/>
+              <a:t>Resultado de +20 - success fee de $4 nuevo manager = $96</a:t>
+            </a:r>
+          </a:p>
+          <a:p>
+            <a:pPr lvl="0" indent="0" marL="0">
+              <a:buNone/>
+            </a:pPr>
+            <a:r>
+              <a:rPr/>
+              <a:t>Supone un success fee del 20%.</a:t>
+            </a:r>
+          </a:p>
+          <a:p>
+            <a:pPr lvl="0" indent="0" marL="0">
+              <a:buNone/>
+            </a:pPr>
+            <a:r>
+              <a:rPr/>
+              <a:t>Al cambiar de manager se pierde el ‘high watermark’.</a:t>
+            </a:r>
+          </a:p>
+        </p:txBody>
+      </p:sp>
+    </p:spTree>
+  </p:cSld>
+</p:sld>
+</file>
+
+<file path=ppt/slides/slide22.xml><?xml version="1.0" encoding="utf-8"?>
+<p:sld xmlns:a="http://schemas.openxmlformats.org/drawingml/2006/main" xmlns:r="http://schemas.openxmlformats.org/officeDocument/2006/relationships" xmlns:p="http://schemas.openxmlformats.org/presentationml/2006/main">
+  <p:cSld>
+    <p:spTree>
+      <p:nvGrpSpPr>
+        <p:cNvPr id="1" name=""/>
+        <p:cNvGrpSpPr/>
+        <p:nvPr/>
+      </p:nvGrpSpPr>
+      <p:grpSpPr>
+        <a:xfrm>
+          <a:off x="0" y="0"/>
+          <a:ext cx="0" cy="0"/>
+          <a:chOff x="0" y="0"/>
+          <a:chExt cx="0" cy="0"/>
+        </a:xfrm>
+      </p:grpSpPr>
+      <p:sp>
+        <p:nvSpPr>
+          <p:cNvPr id="2" name="Title 1"/>
+          <p:cNvSpPr>
+            <a:spLocks noGrp="1"/>
+          </p:cNvSpPr>
+          <p:nvPr>
+            <p:ph type="title"/>
+          </p:nvPr>
+        </p:nvSpPr>
+        <p:spPr/>
+        <p:txBody>
+          <a:bodyPr/>
+          <a:lstStyle/>
+          <a:p>
+            <a:pPr lvl="0" indent="0" marL="0">
+              <a:buNone/>
+            </a:pPr>
+            <a:r>
+              <a:rPr/>
+              <a:t>Riesgo de negocio y High Watermark</a:t>
+            </a:r>
+          </a:p>
+        </p:txBody>
+      </p:sp>
+      <p:pic>
+        <p:nvPicPr>
+          <p:cNvPr descr="images/high%20watermark.png" id="0" name="Picture 1"/>
+          <p:cNvPicPr>
+            <a:picLocks noGrp="1" noChangeAspect="1"/>
+          </p:cNvPicPr>
+          <p:nvPr/>
+        </p:nvPicPr>
+        <p:blipFill>
+          <a:blip r:embed="rId2"/>
+          <a:stretch>
+            <a:fillRect/>
+          </a:stretch>
+        </p:blipFill>
+        <p:spPr bwMode="auto">
+          <a:xfrm>
+            <a:off x="1219200" y="1193800"/>
+            <a:ext cx="6705600" cy="3390900"/>
+          </a:xfrm>
+          <a:prstGeom prst="rect">
+            <a:avLst/>
+          </a:prstGeom>
+          <a:noFill/>
+          <a:ln w="9525">
+            <a:noFill/>
+            <a:headEnd/>
+            <a:tailEnd/>
+          </a:ln>
+        </p:spPr>
+      </p:pic>
+    </p:spTree>
+  </p:cSld>
+</p:sld>
+</file>
+
+<file path=ppt/slides/slide23.xml><?xml version="1.0" encoding="utf-8"?>
+<p:sld xmlns:a="http://schemas.openxmlformats.org/drawingml/2006/main" xmlns:r="http://schemas.openxmlformats.org/officeDocument/2006/relationships" xmlns:p="http://schemas.openxmlformats.org/presentationml/2006/main">
+  <p:cSld>
+    <p:spTree>
+      <p:nvGrpSpPr>
+        <p:cNvPr id="1" name=""/>
+        <p:cNvGrpSpPr/>
+        <p:nvPr/>
+      </p:nvGrpSpPr>
+      <p:grpSpPr>
+        <a:xfrm>
+          <a:off x="0" y="0"/>
+          <a:ext cx="0" cy="0"/>
+          <a:chOff x="0" y="0"/>
+          <a:chExt cx="0" cy="0"/>
+        </a:xfrm>
+      </p:grpSpPr>
+      <p:sp>
+        <p:nvSpPr>
+          <p:cNvPr id="3" name="Content Placeholder 2"/>
+          <p:cNvSpPr>
+            <a:spLocks noGrp="1"/>
+          </p:cNvSpPr>
+          <p:nvPr>
+            <p:ph idx="1"/>
+          </p:nvPr>
+        </p:nvSpPr>
+        <p:spPr/>
+        <p:txBody>
+          <a:bodyPr/>
+          <a:lstStyle/>
+          <a:p>
+            <a:pPr lvl="0" indent="0" marL="0">
+              <a:buNone/>
+            </a:pPr>
+            <a:r>
+              <a:rPr/>
+              <a:t>Asumiendo un performance fee de 20%</a:t>
+            </a:r>
+          </a:p>
+        </p:txBody>
+      </p:sp>
+    </p:spTree>
+  </p:cSld>
+</p:sld>
+</file>
+
+<file path=ppt/slides/slide24.xml><?xml version="1.0" encoding="utf-8"?>
+<p:sld xmlns:a="http://schemas.openxmlformats.org/drawingml/2006/main" xmlns:r="http://schemas.openxmlformats.org/officeDocument/2006/relationships" xmlns:p="http://schemas.openxmlformats.org/presentationml/2006/main">
+  <p:cSld>
+    <p:spTree>
+      <p:nvGrpSpPr>
+        <p:cNvPr id="1" name=""/>
+        <p:cNvGrpSpPr/>
+        <p:nvPr/>
+      </p:nvGrpSpPr>
+      <p:grpSpPr>
+        <a:xfrm>
+          <a:off x="0" y="0"/>
+          <a:ext cx="0" cy="0"/>
+          <a:chOff x="0" y="0"/>
+          <a:chExt cx="0" cy="0"/>
+        </a:xfrm>
+      </p:grpSpPr>
+      <p:sp>
+        <p:nvSpPr>
+          <p:cNvPr id="2" name="Title 1"/>
+          <p:cNvSpPr>
+            <a:spLocks noGrp="1"/>
+          </p:cNvSpPr>
+          <p:nvPr>
+            <p:ph type="title"/>
+          </p:nvPr>
+        </p:nvSpPr>
+        <p:spPr/>
+        <p:txBody>
+          <a:bodyPr/>
+          <a:lstStyle/>
+          <a:p>
+            <a:pPr lvl="0" indent="0" marL="0">
+              <a:buNone/>
+            </a:pPr>
+            <a:r>
+              <a:rPr/>
+              <a:t>Idiosincracia y ‘path dependence’</a:t>
+            </a:r>
+          </a:p>
+        </p:txBody>
+      </p:sp>
+      <p:pic>
+        <p:nvPicPr>
+          <p:cNvPr descr="images/idiosincracia%20de%20los%20managers.png" id="0" name="Picture 1"/>
+          <p:cNvPicPr>
+            <a:picLocks noGrp="1" noChangeAspect="1"/>
+          </p:cNvPicPr>
+          <p:nvPr/>
+        </p:nvPicPr>
+        <p:blipFill>
+          <a:blip r:embed="rId2"/>
+          <a:stretch>
+            <a:fillRect/>
+          </a:stretch>
+        </p:blipFill>
+        <p:spPr bwMode="auto">
+          <a:xfrm>
+            <a:off x="1955800" y="1193800"/>
+            <a:ext cx="5219700" cy="3390900"/>
+          </a:xfrm>
+          <a:prstGeom prst="rect">
+            <a:avLst/>
+          </a:prstGeom>
+          <a:noFill/>
+          <a:ln w="9525">
+            <a:noFill/>
+            <a:headEnd/>
+            <a:tailEnd/>
+          </a:ln>
+        </p:spPr>
+      </p:pic>
+    </p:spTree>
+  </p:cSld>
+</p:sld>
+</file>
+
+<file path=ppt/slides/slide25.xml><?xml version="1.0" encoding="utf-8"?>
 <p:sld xmlns:a="http://schemas.openxmlformats.org/drawingml/2006/main" xmlns:r="http://schemas.openxmlformats.org/officeDocument/2006/relationships" xmlns:p="http://schemas.openxmlformats.org/presentationml/2006/main">
   <p:cSld>
     <p:spTree>
@@ -3579,7 +4546,7 @@
 </p:sld>
 </file>
 
-<file path=ppt/slides/slide14.xml><?xml version="1.0" encoding="utf-8"?>
+<file path=ppt/slides/slide26.xml><?xml version="1.0" encoding="utf-8"?>
 <p:sld xmlns:a="http://schemas.openxmlformats.org/drawingml/2006/main" xmlns:r="http://schemas.openxmlformats.org/officeDocument/2006/relationships" xmlns:p="http://schemas.openxmlformats.org/presentationml/2006/main">
   <p:cSld>
     <p:spTree>
@@ -3606,12 +4573,7 @@
             <p:ph type="title"/>
           </p:nvPr>
         </p:nvSpPr>
-        <p:spPr>
-          <a:xfrm>
-            <a:off x="457201" y="204787"/>
-            <a:ext cx="3008313" cy="871538"/>
-          </a:xfrm>
-        </p:spPr>
+        <p:spPr/>
         <p:txBody>
           <a:bodyPr/>
           <a:lstStyle/>
@@ -3626,14 +4588,36 @@
           </a:p>
         </p:txBody>
       </p:sp>
-      <p:sp>
-        <p:nvSpPr>
-          <p:cNvPr id="4" name="Text Placeholder 3"/>
-          <p:cNvSpPr>
-            <a:spLocks noGrp="1"/>
-          </p:cNvSpPr>
-          <p:nvPr>
-            <p:ph idx="2" sz="half" type="body"/>
+    </p:spTree>
+  </p:cSld>
+</p:sld>
+</file>
+
+<file path=ppt/slides/slide27.xml><?xml version="1.0" encoding="utf-8"?>
+<p:sld xmlns:a="http://schemas.openxmlformats.org/drawingml/2006/main" xmlns:r="http://schemas.openxmlformats.org/officeDocument/2006/relationships" xmlns:p="http://schemas.openxmlformats.org/presentationml/2006/main">
+  <p:cSld>
+    <p:spTree>
+      <p:nvGrpSpPr>
+        <p:cNvPr id="1" name=""/>
+        <p:cNvGrpSpPr/>
+        <p:nvPr/>
+      </p:nvGrpSpPr>
+      <p:grpSpPr>
+        <a:xfrm>
+          <a:off x="0" y="0"/>
+          <a:ext cx="0" cy="0"/>
+          <a:chOff x="0" y="0"/>
+          <a:chExt cx="0" cy="0"/>
+        </a:xfrm>
+      </p:grpSpPr>
+      <p:sp>
+        <p:nvSpPr>
+          <p:cNvPr id="2" name="Title 1"/>
+          <p:cNvSpPr>
+            <a:spLocks noGrp="1"/>
+          </p:cNvSpPr>
+          <p:nvPr>
+            <p:ph type="title"/>
           </p:nvPr>
         </p:nvSpPr>
         <p:spPr/>
@@ -3642,13 +4626,10 @@
           <a:lstStyle/>
           <a:p>
             <a:pPr lvl="0" indent="0" marL="0">
-              <a:spcBef>
-                <a:spcPts val="3000"/>
-              </a:spcBef>
               <a:buNone/>
             </a:pPr>
             <a:r>
-              <a:rPr b="1"/>
+              <a:rPr/>
               <a:t>Crabel</a:t>
             </a:r>
           </a:p>
@@ -3670,8 +4651,8 @@
         </p:blipFill>
         <p:spPr bwMode="auto">
           <a:xfrm>
-            <a:off x="3568700" y="1460500"/>
-            <a:ext cx="5105400" cy="1854200"/>
+            <a:off x="457200" y="1397000"/>
+            <a:ext cx="8229600" cy="2984500"/>
           </a:xfrm>
           <a:prstGeom prst="rect">
             <a:avLst/>
@@ -3689,7 +4670,7 @@
 </p:sld>
 </file>
 
-<file path=ppt/slides/slide15.xml><?xml version="1.0" encoding="utf-8"?>
+<file path=ppt/slides/slide28.xml><?xml version="1.0" encoding="utf-8"?>
 <p:sld xmlns:a="http://schemas.openxmlformats.org/drawingml/2006/main" xmlns:r="http://schemas.openxmlformats.org/officeDocument/2006/relationships" xmlns:p="http://schemas.openxmlformats.org/presentationml/2006/main">
   <p:cSld>
     <p:spTree>
@@ -3708,12 +4689,12 @@
       </p:grpSpPr>
       <p:sp>
         <p:nvSpPr>
-          <p:cNvPr id="4" name="Text Placeholder 3"/>
-          <p:cNvSpPr>
-            <a:spLocks noGrp="1"/>
-          </p:cNvSpPr>
-          <p:nvPr>
-            <p:ph idx="2" sz="half" type="body"/>
+          <p:cNvPr id="3" name="Content Placeholder 2"/>
+          <p:cNvSpPr>
+            <a:spLocks noGrp="1"/>
+          </p:cNvSpPr>
+          <p:nvPr>
+            <p:ph idx="1"/>
           </p:nvPr>
         </p:nvSpPr>
         <p:spPr/>
@@ -3729,15 +4710,50 @@
               <a:t>Es un fondo nuevo, pero vemos lo que hace. Nosotros fuimos los primeros inversores.</a:t>
             </a:r>
           </a:p>
+        </p:txBody>
+      </p:sp>
+    </p:spTree>
+  </p:cSld>
+</p:sld>
+</file>
+
+<file path=ppt/slides/slide29.xml><?xml version="1.0" encoding="utf-8"?>
+<p:sld xmlns:a="http://schemas.openxmlformats.org/drawingml/2006/main" xmlns:r="http://schemas.openxmlformats.org/officeDocument/2006/relationships" xmlns:p="http://schemas.openxmlformats.org/presentationml/2006/main">
+  <p:cSld>
+    <p:spTree>
+      <p:nvGrpSpPr>
+        <p:cNvPr id="1" name=""/>
+        <p:cNvGrpSpPr/>
+        <p:nvPr/>
+      </p:nvGrpSpPr>
+      <p:grpSpPr>
+        <a:xfrm>
+          <a:off x="0" y="0"/>
+          <a:ext cx="0" cy="0"/>
+          <a:chOff x="0" y="0"/>
+          <a:chExt cx="0" cy="0"/>
+        </a:xfrm>
+      </p:grpSpPr>
+      <p:sp>
+        <p:nvSpPr>
+          <p:cNvPr id="2" name="Title 1"/>
+          <p:cNvSpPr>
+            <a:spLocks noGrp="1"/>
+          </p:cNvSpPr>
+          <p:nvPr>
+            <p:ph type="title"/>
+          </p:nvPr>
+        </p:nvSpPr>
+        <p:spPr/>
+        <p:txBody>
+          <a:bodyPr/>
+          <a:lstStyle/>
           <a:p>
             <a:pPr lvl="0" indent="0" marL="0">
-              <a:spcBef>
-                <a:spcPts val="3000"/>
-              </a:spcBef>
               <a:buNone/>
             </a:pPr>
             <a:r>
-              <a:rPr b="1"/>
+              <a:rPr/>
               <a:t>Crabel mantiene su perfil de volatilidad</a:t>
             </a:r>
           </a:p>
@@ -3759,8 +4775,8 @@
         </p:blipFill>
         <p:spPr bwMode="auto">
           <a:xfrm>
-            <a:off x="3568700" y="635000"/>
-            <a:ext cx="5105400" cy="3505200"/>
+            <a:off x="2108200" y="1193800"/>
+            <a:ext cx="4940300" cy="3390900"/>
           </a:xfrm>
           <a:prstGeom prst="rect">
             <a:avLst/>
@@ -3773,260 +4789,6 @@
           </a:ln>
         </p:spPr>
       </p:pic>
-    </p:spTree>
-  </p:cSld>
-</p:sld>
-</file>
-
-<file path=ppt/slides/slide16.xml><?xml version="1.0" encoding="utf-8"?>
-<p:sld xmlns:a="http://schemas.openxmlformats.org/drawingml/2006/main" xmlns:r="http://schemas.openxmlformats.org/officeDocument/2006/relationships" xmlns:p="http://schemas.openxmlformats.org/presentationml/2006/main">
-  <p:cSld>
-    <p:spTree>
-      <p:nvGrpSpPr>
-        <p:cNvPr id="1" name=""/>
-        <p:cNvGrpSpPr/>
-        <p:nvPr/>
-      </p:nvGrpSpPr>
-      <p:grpSpPr>
-        <a:xfrm>
-          <a:off x="0" y="0"/>
-          <a:ext cx="0" cy="0"/>
-          <a:chOff x="0" y="0"/>
-          <a:chExt cx="0" cy="0"/>
-        </a:xfrm>
-      </p:grpSpPr>
-      <p:sp>
-        <p:nvSpPr>
-          <p:cNvPr id="4" name="Text Placeholder 3"/>
-          <p:cNvSpPr>
-            <a:spLocks noGrp="1"/>
-          </p:cNvSpPr>
-          <p:nvPr>
-            <p:ph idx="2" sz="half" type="body"/>
-          </p:nvPr>
-        </p:nvSpPr>
-        <p:spPr/>
-        <p:txBody>
-          <a:bodyPr/>
-          <a:lstStyle/>
-          <a:p>
-            <a:pPr lvl="0" indent="0" marL="0">
-              <a:spcBef>
-                <a:spcPts val="3000"/>
-              </a:spcBef>
-              <a:buNone/>
-            </a:pPr>
-            <a:r>
-              <a:rPr b="1"/>
-              <a:t>Winton cambió el fondo</a:t>
-            </a:r>
-          </a:p>
-        </p:txBody>
-      </p:sp>
-      <p:pic>
-        <p:nvPicPr>
-          <p:cNvPr descr="powerpoint-output_files/figure-pptx/unnamed-chunk-4-1.png" id="0" name="Picture 1"/>
-          <p:cNvPicPr>
-            <a:picLocks noGrp="1" noChangeAspect="1"/>
-          </p:cNvPicPr>
-          <p:nvPr/>
-        </p:nvPicPr>
-        <p:blipFill>
-          <a:blip r:embed="rId2"/>
-          <a:stretch>
-            <a:fillRect/>
-          </a:stretch>
-        </p:blipFill>
-        <p:spPr bwMode="auto">
-          <a:xfrm>
-            <a:off x="3568700" y="1117600"/>
-            <a:ext cx="5105400" cy="2552700"/>
-          </a:xfrm>
-          <a:prstGeom prst="rect">
-            <a:avLst/>
-          </a:prstGeom>
-          <a:noFill/>
-          <a:ln w="9525">
-            <a:noFill/>
-            <a:headEnd/>
-            <a:tailEnd/>
-          </a:ln>
-        </p:spPr>
-      </p:pic>
-    </p:spTree>
-  </p:cSld>
-</p:sld>
-</file>
-
-<file path=ppt/slides/slide17.xml><?xml version="1.0" encoding="utf-8"?>
-<p:sld xmlns:a="http://schemas.openxmlformats.org/drawingml/2006/main" xmlns:r="http://schemas.openxmlformats.org/officeDocument/2006/relationships" xmlns:p="http://schemas.openxmlformats.org/presentationml/2006/main">
-  <p:cSld>
-    <p:spTree>
-      <p:nvGrpSpPr>
-        <p:cNvPr id="1" name=""/>
-        <p:cNvGrpSpPr/>
-        <p:nvPr/>
-      </p:nvGrpSpPr>
-      <p:grpSpPr>
-        <a:xfrm>
-          <a:off x="0" y="0"/>
-          <a:ext cx="0" cy="0"/>
-          <a:chOff x="0" y="0"/>
-          <a:chExt cx="0" cy="0"/>
-        </a:xfrm>
-      </p:grpSpPr>
-    </p:spTree>
-  </p:cSld>
-</p:sld>
-</file>
-
-<file path=ppt/slides/slide2.xml><?xml version="1.0" encoding="utf-8"?>
-<p:sld xmlns:a="http://schemas.openxmlformats.org/drawingml/2006/main" xmlns:r="http://schemas.openxmlformats.org/officeDocument/2006/relationships" xmlns:p="http://schemas.openxmlformats.org/presentationml/2006/main">
-  <p:cSld>
-    <p:spTree>
-      <p:nvGrpSpPr>
-        <p:cNvPr id="1" name=""/>
-        <p:cNvGrpSpPr/>
-        <p:nvPr/>
-      </p:nvGrpSpPr>
-      <p:grpSpPr>
-        <a:xfrm>
-          <a:off x="0" y="0"/>
-          <a:ext cx="0" cy="0"/>
-          <a:chOff x="0" y="0"/>
-          <a:chExt cx="0" cy="0"/>
-        </a:xfrm>
-      </p:grpSpPr>
-      <p:sp>
-        <p:nvSpPr>
-          <p:cNvPr id="2" name="Title 1"/>
-          <p:cNvSpPr>
-            <a:spLocks noGrp="1"/>
-          </p:cNvSpPr>
-          <p:nvPr>
-            <p:ph type="title"/>
-          </p:nvPr>
-        </p:nvSpPr>
-        <p:spPr/>
-        <p:txBody>
-          <a:bodyPr/>
-          <a:lstStyle/>
-          <a:p>
-            <a:pPr lvl="0" indent="0" marL="0">
-              <a:buNone/>
-            </a:pPr>
-            <a:r>
-              <a:rPr/>
-              <a:t>Conclusiones</a:t>
-            </a:r>
-          </a:p>
-        </p:txBody>
-      </p:sp>
-      <p:sp>
-        <p:nvSpPr>
-          <p:cNvPr id="3" name="Content Placeholder 2"/>
-          <p:cNvSpPr>
-            <a:spLocks noGrp="1"/>
-          </p:cNvSpPr>
-          <p:nvPr>
-            <p:ph idx="1"/>
-          </p:nvPr>
-        </p:nvSpPr>
-        <p:spPr/>
-        <p:txBody>
-          <a:bodyPr/>
-          <a:lstStyle/>
-          <a:p>
-            <a:pPr lvl="0" indent="0" marL="0">
-              <a:spcBef>
-                <a:spcPts val="3000"/>
-              </a:spcBef>
-              <a:buNone/>
-            </a:pPr>
-            <a:r>
-              <a:rPr b="1"/>
-              <a:t>Conclusiones</a:t>
-            </a:r>
-          </a:p>
-          <a:p>
-            <a:pPr lvl="0"/>
-            <a:r>
-              <a:rPr/>
-              <a:t>Trend Following mejora el retorno y el riesgo de un portafolio ‘buy and hold’.</a:t>
-            </a:r>
-          </a:p>
-          <a:p>
-            <a:pPr lvl="0"/>
-            <a:r>
-              <a:rPr/>
-              <a:t>La selección de un manager depende del objetivo: a) tener Trend Following o b) cubrir riesgos de accidente.</a:t>
-            </a:r>
-          </a:p>
-          <a:p>
-            <a:pPr lvl="0"/>
-            <a:r>
-              <a:rPr/>
-              <a:t>Hay dos tipos de managers: ‘vieja escuela’ e ‘institucionales’.</a:t>
-            </a:r>
-          </a:p>
-          <a:p>
-            <a:pPr lvl="0"/>
-            <a:r>
-              <a:rPr/>
-              <a:t>De acuerdo al tipo de manager es el porcentaje del portafolio a invertir.</a:t>
-            </a:r>
-          </a:p>
-          <a:p>
-            <a:pPr lvl="0" indent="0" marL="0">
-              <a:spcBef>
-                <a:spcPts val="3000"/>
-              </a:spcBef>
-              <a:buNone/>
-            </a:pPr>
-            <a:r>
-              <a:rPr b="1"/>
-              <a:t>Fondos seleccionados</a:t>
-            </a:r>
-          </a:p>
-          <a:p>
-            <a:pPr lvl="0" indent="0" marL="0">
-              <a:buNone/>
-            </a:pPr>
-            <a:r>
-              <a:rPr/>
-              <a:t>La característica principal para elegir un fondo es que tenga un track record largo haciendo lo mismo.</a:t>
-            </a:r>
-          </a:p>
-          <a:p>
-            <a:pPr lvl="0"/>
-            <a:r>
-              <a:rPr/>
-              <a:t>Fondos de la ‘vieja escuela’.</a:t>
-            </a:r>
-          </a:p>
-          <a:p>
-            <a:pPr lvl="1"/>
-            <a:r>
-              <a:rPr/>
-              <a:t>Mulvaney, Dunn, Chesapeake.</a:t>
-            </a:r>
-          </a:p>
-          <a:p>
-            <a:pPr lvl="0"/>
-            <a:r>
-              <a:rPr/>
-              <a:t>Fondos ‘institucionales’.</a:t>
-            </a:r>
-          </a:p>
-          <a:p>
-            <a:pPr lvl="1"/>
-            <a:r>
-              <a:rPr/>
-              <a:t>Lynx, Transtrend, Crabel.</a:t>
-            </a:r>
-          </a:p>
-        </p:txBody>
-      </p:sp>
     </p:spTree>
   </p:cSld>
 </p:sld>
@@ -4059,12 +4821,7 @@
             <p:ph type="title"/>
           </p:nvPr>
         </p:nvSpPr>
-        <p:spPr>
-          <a:xfrm>
-            <a:off x="457201" y="204787"/>
-            <a:ext cx="3008313" cy="871538"/>
-          </a:xfrm>
-        </p:spPr>
+        <p:spPr/>
         <p:txBody>
           <a:bodyPr/>
           <a:lstStyle/>
@@ -4074,19 +4831,19 @@
             </a:pPr>
             <a:r>
               <a:rPr/>
-              <a:t>Mejoras a un portafolio</a:t>
-            </a:r>
-          </a:p>
-        </p:txBody>
-      </p:sp>
-      <p:sp>
-        <p:nvSpPr>
-          <p:cNvPr id="4" name="Text Placeholder 3"/>
-          <p:cNvSpPr>
-            <a:spLocks noGrp="1"/>
-          </p:cNvSpPr>
-          <p:nvPr>
-            <p:ph idx="2" sz="half" type="body"/>
+              <a:t>Fondos seleccionados</a:t>
+            </a:r>
+          </a:p>
+        </p:txBody>
+      </p:sp>
+      <p:sp>
+        <p:nvSpPr>
+          <p:cNvPr id="3" name="Content Placeholder 2"/>
+          <p:cNvSpPr>
+            <a:spLocks noGrp="1"/>
+          </p:cNvSpPr>
+          <p:nvPr>
+            <p:ph idx="1"/>
           </p:nvPr>
         </p:nvSpPr>
         <p:spPr/>
@@ -4095,21 +4852,93 @@
           <a:lstStyle/>
           <a:p>
             <a:pPr lvl="0" indent="0" marL="0">
-              <a:spcBef>
-                <a:spcPts val="3000"/>
-              </a:spcBef>
               <a:buNone/>
             </a:pPr>
             <a:r>
-              <a:rPr b="1"/>
-              <a:t>Backtest de AQR de 100 años</a:t>
+              <a:rPr/>
+              <a:t>La característica principal para elegir un fondo es que tenga un track record largo haciendo lo mismo.</a:t>
+            </a:r>
+          </a:p>
+          <a:p>
+            <a:pPr lvl="0"/>
+            <a:r>
+              <a:rPr/>
+              <a:t>Fondos de la ‘vieja escuela’.</a:t>
+            </a:r>
+          </a:p>
+          <a:p>
+            <a:pPr lvl="1"/>
+            <a:r>
+              <a:rPr/>
+              <a:t>Mulvaney, Dunn, Chesapeake.</a:t>
+            </a:r>
+          </a:p>
+          <a:p>
+            <a:pPr lvl="0"/>
+            <a:r>
+              <a:rPr/>
+              <a:t>Fondos ‘institucionales’.</a:t>
+            </a:r>
+          </a:p>
+          <a:p>
+            <a:pPr lvl="1"/>
+            <a:r>
+              <a:rPr/>
+              <a:t>Lynx, Transtrend, Crabel.</a:t>
+            </a:r>
+          </a:p>
+        </p:txBody>
+      </p:sp>
+    </p:spTree>
+  </p:cSld>
+</p:sld>
+</file>
+
+<file path=ppt/slides/slide30.xml><?xml version="1.0" encoding="utf-8"?>
+<p:sld xmlns:a="http://schemas.openxmlformats.org/drawingml/2006/main" xmlns:r="http://schemas.openxmlformats.org/officeDocument/2006/relationships" xmlns:p="http://schemas.openxmlformats.org/presentationml/2006/main">
+  <p:cSld>
+    <p:spTree>
+      <p:nvGrpSpPr>
+        <p:cNvPr id="1" name=""/>
+        <p:cNvGrpSpPr/>
+        <p:nvPr/>
+      </p:nvGrpSpPr>
+      <p:grpSpPr>
+        <a:xfrm>
+          <a:off x="0" y="0"/>
+          <a:ext cx="0" cy="0"/>
+          <a:chOff x="0" y="0"/>
+          <a:chExt cx="0" cy="0"/>
+        </a:xfrm>
+      </p:grpSpPr>
+      <p:sp>
+        <p:nvSpPr>
+          <p:cNvPr id="2" name="Title 1"/>
+          <p:cNvSpPr>
+            <a:spLocks noGrp="1"/>
+          </p:cNvSpPr>
+          <p:nvPr>
+            <p:ph type="title"/>
+          </p:nvPr>
+        </p:nvSpPr>
+        <p:spPr/>
+        <p:txBody>
+          <a:bodyPr/>
+          <a:lstStyle/>
+          <a:p>
+            <a:pPr lvl="0" indent="0" marL="0">
+              <a:buNone/>
+            </a:pPr>
+            <a:r>
+              <a:rPr/>
+              <a:t>Winton cambió el fondo</a:t>
             </a:r>
           </a:p>
         </p:txBody>
       </p:sp>
       <p:pic>
         <p:nvPicPr>
-          <p:cNvPr descr="images/aqr%20trend%20following%20century%20backtest.png" id="0" name="Picture 1"/>
+          <p:cNvPr descr="powerpoint-output_files/figure-pptx/unnamed-chunk-4-1.png" id="0" name="Picture 1"/>
           <p:cNvPicPr>
             <a:picLocks noGrp="1" noChangeAspect="1"/>
           </p:cNvPicPr>
@@ -4123,8 +4952,8 @@
         </p:blipFill>
         <p:spPr bwMode="auto">
           <a:xfrm>
-            <a:off x="3568700" y="1600200"/>
-            <a:ext cx="5105400" cy="1587500"/>
+            <a:off x="1181100" y="1193800"/>
+            <a:ext cx="6781800" cy="3390900"/>
           </a:xfrm>
           <a:prstGeom prst="rect">
             <a:avLst/>
@@ -4137,6 +4966,130 @@
           </a:ln>
         </p:spPr>
       </p:pic>
+    </p:spTree>
+  </p:cSld>
+</p:sld>
+</file>
+
+<file path=ppt/slides/slide31.xml><?xml version="1.0" encoding="utf-8"?>
+<p:sld xmlns:a="http://schemas.openxmlformats.org/drawingml/2006/main" xmlns:r="http://schemas.openxmlformats.org/officeDocument/2006/relationships" xmlns:p="http://schemas.openxmlformats.org/presentationml/2006/main">
+  <p:cSld>
+    <p:spTree>
+      <p:nvGrpSpPr>
+        <p:cNvPr id="1" name=""/>
+        <p:cNvGrpSpPr/>
+        <p:nvPr/>
+      </p:nvGrpSpPr>
+      <p:grpSpPr>
+        <a:xfrm>
+          <a:off x="0" y="0"/>
+          <a:ext cx="0" cy="0"/>
+          <a:chOff x="0" y="0"/>
+          <a:chExt cx="0" cy="0"/>
+        </a:xfrm>
+      </p:grpSpPr>
+      <p:sp>
+        <p:nvSpPr>
+          <p:cNvPr id="2" name="Title 1"/>
+          <p:cNvSpPr>
+            <a:spLocks noGrp="1"/>
+          </p:cNvSpPr>
+          <p:nvPr>
+            <p:ph type="title"/>
+          </p:nvPr>
+        </p:nvSpPr>
+        <p:spPr/>
+        <p:txBody>
+          <a:bodyPr/>
+          <a:lstStyle/>
+          <a:p>
+            <a:pPr lvl="0" indent="0" marL="0">
+              <a:buNone/>
+            </a:pPr>
+            <a:r>
+              <a:rPr/>
+              <a:t>Fondos chicos</a:t>
+            </a:r>
+          </a:p>
+        </p:txBody>
+      </p:sp>
+      <p:pic>
+        <p:nvPicPr>
+          <p:cNvPr descr="images/tabla%20fondos%20chicos.png" id="0" name="Picture 1"/>
+          <p:cNvPicPr>
+            <a:picLocks noGrp="1" noChangeAspect="1"/>
+          </p:cNvPicPr>
+          <p:nvPr/>
+        </p:nvPicPr>
+        <p:blipFill>
+          <a:blip r:embed="rId2"/>
+          <a:stretch>
+            <a:fillRect/>
+          </a:stretch>
+        </p:blipFill>
+        <p:spPr bwMode="auto">
+          <a:xfrm>
+            <a:off x="457200" y="1295400"/>
+            <a:ext cx="8229600" cy="3200400"/>
+          </a:xfrm>
+          <a:prstGeom prst="rect">
+            <a:avLst/>
+          </a:prstGeom>
+          <a:noFill/>
+          <a:ln w="9525">
+            <a:noFill/>
+            <a:headEnd/>
+            <a:tailEnd/>
+          </a:ln>
+        </p:spPr>
+      </p:pic>
+    </p:spTree>
+  </p:cSld>
+</p:sld>
+</file>
+
+<file path=ppt/slides/slide32.xml><?xml version="1.0" encoding="utf-8"?>
+<p:sld xmlns:a="http://schemas.openxmlformats.org/drawingml/2006/main" xmlns:r="http://schemas.openxmlformats.org/officeDocument/2006/relationships" xmlns:p="http://schemas.openxmlformats.org/presentationml/2006/main">
+  <p:cSld>
+    <p:spTree>
+      <p:nvGrpSpPr>
+        <p:cNvPr id="1" name=""/>
+        <p:cNvGrpSpPr/>
+        <p:nvPr/>
+      </p:nvGrpSpPr>
+      <p:grpSpPr>
+        <a:xfrm>
+          <a:off x="0" y="0"/>
+          <a:ext cx="0" cy="0"/>
+          <a:chOff x="0" y="0"/>
+          <a:chExt cx="0" cy="0"/>
+        </a:xfrm>
+      </p:grpSpPr>
+      <p:sp>
+        <p:nvSpPr>
+          <p:cNvPr id="2" name="Title 1"/>
+          <p:cNvSpPr>
+            <a:spLocks noGrp="1"/>
+          </p:cNvSpPr>
+          <p:nvPr>
+            <p:ph type="title"/>
+          </p:nvPr>
+        </p:nvSpPr>
+        <p:spPr/>
+        <p:txBody>
+          <a:bodyPr/>
+          <a:lstStyle/>
+          <a:p>
+            <a:pPr lvl="0" indent="0" marL="0">
+              <a:buNone/>
+            </a:pPr>
+            <a:r>
+              <a:rPr/>
+              <a:t>Mutual Funds y ETF</a:t>
+            </a:r>
+          </a:p>
+        </p:txBody>
+      </p:sp>
     </p:spTree>
   </p:cSld>
 </p:sld>
@@ -4161,12 +5114,12 @@
       </p:grpSpPr>
       <p:sp>
         <p:nvSpPr>
-          <p:cNvPr id="4" name="Text Placeholder 3"/>
-          <p:cNvSpPr>
-            <a:spLocks noGrp="1"/>
-          </p:cNvSpPr>
-          <p:nvPr>
-            <p:ph idx="2" sz="half" type="body"/>
+          <p:cNvPr id="2" name="Title 1"/>
+          <p:cNvSpPr>
+            <a:spLocks noGrp="1"/>
+          </p:cNvSpPr>
+          <p:nvPr>
+            <p:ph type="title"/>
           </p:nvPr>
         </p:nvSpPr>
         <p:spPr/>
@@ -4179,35 +5132,61 @@
             </a:pPr>
             <a:r>
               <a:rPr/>
-              <a:t>En esl backtest, agregar una estrategia de Trend Following (Time-Series Momentum) a un portafolio 60/40 mehora el retorno ajustado a riesgo de x0.39 a x0.55.</a:t>
-            </a:r>
-          </a:p>
+              <a:t>Mejoras a un portafolio</a:t>
+            </a:r>
+          </a:p>
+        </p:txBody>
+      </p:sp>
+    </p:spTree>
+  </p:cSld>
+</p:sld>
+</file>
+
+<file path=ppt/slides/slide5.xml><?xml version="1.0" encoding="utf-8"?>
+<p:sld xmlns:a="http://schemas.openxmlformats.org/drawingml/2006/main" xmlns:r="http://schemas.openxmlformats.org/officeDocument/2006/relationships" xmlns:p="http://schemas.openxmlformats.org/presentationml/2006/main">
+  <p:cSld>
+    <p:spTree>
+      <p:nvGrpSpPr>
+        <p:cNvPr id="1" name=""/>
+        <p:cNvGrpSpPr/>
+        <p:nvPr/>
+      </p:nvGrpSpPr>
+      <p:grpSpPr>
+        <a:xfrm>
+          <a:off x="0" y="0"/>
+          <a:ext cx="0" cy="0"/>
+          <a:chOff x="0" y="0"/>
+          <a:chExt cx="0" cy="0"/>
+        </a:xfrm>
+      </p:grpSpPr>
+      <p:sp>
+        <p:nvSpPr>
+          <p:cNvPr id="2" name="Title 1"/>
+          <p:cNvSpPr>
+            <a:spLocks noGrp="1"/>
+          </p:cNvSpPr>
+          <p:nvPr>
+            <p:ph type="title"/>
+          </p:nvPr>
+        </p:nvSpPr>
+        <p:spPr/>
+        <p:txBody>
+          <a:bodyPr/>
+          <a:lstStyle/>
           <a:p>
             <a:pPr lvl="0" indent="0" marL="0">
               <a:buNone/>
             </a:pPr>
             <a:r>
               <a:rPr/>
-              <a:t>Esto es un backtest con un retorno de 7.3% anual y volatilidad de 9.7% desde 1880 a 2016 (es decir una estrategia de baja volatilidad). La alocación es 20% a trend following.</a:t>
-            </a:r>
-          </a:p>
-          <a:p>
-            <a:pPr lvl="0" indent="0" marL="0">
-              <a:spcBef>
-                <a:spcPts val="3000"/>
-              </a:spcBef>
-              <a:buNone/>
-            </a:pPr>
-            <a:r>
-              <a:rPr b="1"/>
-              <a:t>Trend Following ayuda en las crisis</a:t>
+              <a:t>Backtest de AQR de 100 años</a:t>
             </a:r>
           </a:p>
         </p:txBody>
       </p:sp>
       <p:pic>
         <p:nvPicPr>
-          <p:cNvPr descr="images/trend%20following%20ayuda%20en%20las%20crisis.png" id="0" name="Picture 1"/>
+          <p:cNvPr descr="images/aqr%20trend%20following%20century%20backtest.png" id="0" name="Picture 1"/>
           <p:cNvPicPr>
             <a:picLocks noGrp="1" noChangeAspect="1"/>
           </p:cNvPicPr>
@@ -4221,8 +5200,8 @@
         </p:blipFill>
         <p:spPr bwMode="auto">
           <a:xfrm>
-            <a:off x="3568700" y="1206500"/>
-            <a:ext cx="5105400" cy="2374900"/>
+            <a:off x="457200" y="1612900"/>
+            <a:ext cx="8229600" cy="2552700"/>
           </a:xfrm>
           <a:prstGeom prst="rect">
             <a:avLst/>
@@ -4240,7 +5219,140 @@
 </p:sld>
 </file>
 
-<file path=ppt/slides/slide5.xml><?xml version="1.0" encoding="utf-8"?>
+<file path=ppt/slides/slide6.xml><?xml version="1.0" encoding="utf-8"?>
+<p:sld xmlns:a="http://schemas.openxmlformats.org/drawingml/2006/main" xmlns:r="http://schemas.openxmlformats.org/officeDocument/2006/relationships" xmlns:p="http://schemas.openxmlformats.org/presentationml/2006/main">
+  <p:cSld>
+    <p:spTree>
+      <p:nvGrpSpPr>
+        <p:cNvPr id="1" name=""/>
+        <p:cNvGrpSpPr/>
+        <p:nvPr/>
+      </p:nvGrpSpPr>
+      <p:grpSpPr>
+        <a:xfrm>
+          <a:off x="0" y="0"/>
+          <a:ext cx="0" cy="0"/>
+          <a:chOff x="0" y="0"/>
+          <a:chExt cx="0" cy="0"/>
+        </a:xfrm>
+      </p:grpSpPr>
+      <p:sp>
+        <p:nvSpPr>
+          <p:cNvPr id="3" name="Content Placeholder 2"/>
+          <p:cNvSpPr>
+            <a:spLocks noGrp="1"/>
+          </p:cNvSpPr>
+          <p:nvPr>
+            <p:ph idx="1"/>
+          </p:nvPr>
+        </p:nvSpPr>
+        <p:spPr/>
+        <p:txBody>
+          <a:bodyPr/>
+          <a:lstStyle/>
+          <a:p>
+            <a:pPr lvl="0" indent="0" marL="0">
+              <a:buNone/>
+            </a:pPr>
+            <a:r>
+              <a:rPr/>
+              <a:t>En esl backtest, agregar una estrategia de Trend Following (Time-Series Momentum) a un portafolio 60/40 mehora el retorno ajustado a riesgo de x0.39 a x0.55.</a:t>
+            </a:r>
+          </a:p>
+          <a:p>
+            <a:pPr lvl="0" indent="0" marL="0">
+              <a:buNone/>
+            </a:pPr>
+            <a:r>
+              <a:rPr/>
+              <a:t>Esto es un backtest con un retorno de 7.3% anual y volatilidad de 9.7% desde 1880 a 2016 (es decir una estrategia de baja volatilidad). La alocación es 20% a trend following.</a:t>
+            </a:r>
+          </a:p>
+        </p:txBody>
+      </p:sp>
+    </p:spTree>
+  </p:cSld>
+</p:sld>
+</file>
+
+<file path=ppt/slides/slide7.xml><?xml version="1.0" encoding="utf-8"?>
+<p:sld xmlns:a="http://schemas.openxmlformats.org/drawingml/2006/main" xmlns:r="http://schemas.openxmlformats.org/officeDocument/2006/relationships" xmlns:p="http://schemas.openxmlformats.org/presentationml/2006/main">
+  <p:cSld>
+    <p:spTree>
+      <p:nvGrpSpPr>
+        <p:cNvPr id="1" name=""/>
+        <p:cNvGrpSpPr/>
+        <p:nvPr/>
+      </p:nvGrpSpPr>
+      <p:grpSpPr>
+        <a:xfrm>
+          <a:off x="0" y="0"/>
+          <a:ext cx="0" cy="0"/>
+          <a:chOff x="0" y="0"/>
+          <a:chExt cx="0" cy="0"/>
+        </a:xfrm>
+      </p:grpSpPr>
+      <p:sp>
+        <p:nvSpPr>
+          <p:cNvPr id="2" name="Title 1"/>
+          <p:cNvSpPr>
+            <a:spLocks noGrp="1"/>
+          </p:cNvSpPr>
+          <p:nvPr>
+            <p:ph type="title"/>
+          </p:nvPr>
+        </p:nvSpPr>
+        <p:spPr/>
+        <p:txBody>
+          <a:bodyPr/>
+          <a:lstStyle/>
+          <a:p>
+            <a:pPr lvl="0" indent="0" marL="0">
+              <a:buNone/>
+            </a:pPr>
+            <a:r>
+              <a:rPr/>
+              <a:t>Trend Following ayuda en las crisis</a:t>
+            </a:r>
+          </a:p>
+        </p:txBody>
+      </p:sp>
+      <p:pic>
+        <p:nvPicPr>
+          <p:cNvPr descr="images/trend%20following%20ayuda%20en%20las%20crisis.png" id="0" name="Picture 1"/>
+          <p:cNvPicPr>
+            <a:picLocks noGrp="1" noChangeAspect="1"/>
+          </p:cNvPicPr>
+          <p:nvPr/>
+        </p:nvPicPr>
+        <p:blipFill>
+          <a:blip r:embed="rId2"/>
+          <a:stretch>
+            <a:fillRect/>
+          </a:stretch>
+        </p:blipFill>
+        <p:spPr bwMode="auto">
+          <a:xfrm>
+            <a:off x="914400" y="1193800"/>
+            <a:ext cx="7302500" cy="3390900"/>
+          </a:xfrm>
+          <a:prstGeom prst="rect">
+            <a:avLst/>
+          </a:prstGeom>
+          <a:noFill/>
+          <a:ln w="9525">
+            <a:noFill/>
+            <a:headEnd/>
+            <a:tailEnd/>
+          </a:ln>
+        </p:spPr>
+      </p:pic>
+    </p:spTree>
+  </p:cSld>
+</p:sld>
+</file>
+
+<file path=ppt/slides/slide8.xml><?xml version="1.0" encoding="utf-8"?>
 <p:sld xmlns:a="http://schemas.openxmlformats.org/drawingml/2006/main" xmlns:r="http://schemas.openxmlformats.org/officeDocument/2006/relationships" xmlns:p="http://schemas.openxmlformats.org/presentationml/2006/main">
   <p:cSld>
     <p:spTree>
@@ -4317,400 +5429,6 @@
 </p:sld>
 </file>
 
-<file path=ppt/slides/slide6.xml><?xml version="1.0" encoding="utf-8"?>
-<p:sld xmlns:a="http://schemas.openxmlformats.org/drawingml/2006/main" xmlns:r="http://schemas.openxmlformats.org/officeDocument/2006/relationships" xmlns:p="http://schemas.openxmlformats.org/presentationml/2006/main">
-  <p:cSld>
-    <p:spTree>
-      <p:nvGrpSpPr>
-        <p:cNvPr id="1" name=""/>
-        <p:cNvGrpSpPr/>
-        <p:nvPr/>
-      </p:nvGrpSpPr>
-      <p:grpSpPr>
-        <a:xfrm>
-          <a:off x="0" y="0"/>
-          <a:ext cx="0" cy="0"/>
-          <a:chOff x="0" y="0"/>
-          <a:chExt cx="0" cy="0"/>
-        </a:xfrm>
-      </p:grpSpPr>
-      <p:sp>
-        <p:nvSpPr>
-          <p:cNvPr id="4" name="Text Placeholder 3"/>
-          <p:cNvSpPr>
-            <a:spLocks noGrp="1"/>
-          </p:cNvSpPr>
-          <p:nvPr>
-            <p:ph idx="2" sz="half" type="body"/>
-          </p:nvPr>
-        </p:nvSpPr>
-        <p:spPr/>
-        <p:txBody>
-          <a:bodyPr/>
-          <a:lstStyle/>
-          <a:p>
-            <a:pPr lvl="0" indent="0" marL="0">
-              <a:spcBef>
-                <a:spcPts val="3000"/>
-              </a:spcBef>
-              <a:buNone/>
-            </a:pPr>
-            <a:r>
-              <a:rPr b="1"/>
-              <a:t>Contribución al portafolio</a:t>
-            </a:r>
-          </a:p>
-        </p:txBody>
-      </p:sp>
-      <p:pic>
-        <p:nvPicPr>
-          <p:cNvPr descr="images/contribucio%CC%81n%20al%20benchmark.png" id="0" name="Picture 1"/>
-          <p:cNvPicPr>
-            <a:picLocks noGrp="1" noChangeAspect="1"/>
-          </p:cNvPicPr>
-          <p:nvPr/>
-        </p:nvPicPr>
-        <p:blipFill>
-          <a:blip r:embed="rId2"/>
-          <a:stretch>
-            <a:fillRect/>
-          </a:stretch>
-        </p:blipFill>
-        <p:spPr bwMode="auto">
-          <a:xfrm>
-            <a:off x="3568700" y="685800"/>
-            <a:ext cx="5105400" cy="3416300"/>
-          </a:xfrm>
-          <a:prstGeom prst="rect">
-            <a:avLst/>
-          </a:prstGeom>
-          <a:noFill/>
-          <a:ln w="9525">
-            <a:noFill/>
-            <a:headEnd/>
-            <a:tailEnd/>
-          </a:ln>
-        </p:spPr>
-      </p:pic>
-    </p:spTree>
-  </p:cSld>
-</p:sld>
-</file>
-
-<file path=ppt/slides/slide7.xml><?xml version="1.0" encoding="utf-8"?>
-<p:sld xmlns:a="http://schemas.openxmlformats.org/drawingml/2006/main" xmlns:r="http://schemas.openxmlformats.org/officeDocument/2006/relationships" xmlns:p="http://schemas.openxmlformats.org/presentationml/2006/main">
-  <p:cSld>
-    <p:spTree>
-      <p:nvGrpSpPr>
-        <p:cNvPr id="1" name=""/>
-        <p:cNvGrpSpPr/>
-        <p:nvPr/>
-      </p:nvGrpSpPr>
-      <p:grpSpPr>
-        <a:xfrm>
-          <a:off x="0" y="0"/>
-          <a:ext cx="0" cy="0"/>
-          <a:chOff x="0" y="0"/>
-          <a:chExt cx="0" cy="0"/>
-        </a:xfrm>
-      </p:grpSpPr>
-      <p:sp>
-        <p:nvSpPr>
-          <p:cNvPr id="4" name="Text Placeholder 3"/>
-          <p:cNvSpPr>
-            <a:spLocks noGrp="1"/>
-          </p:cNvSpPr>
-          <p:nvPr>
-            <p:ph idx="2" sz="half" type="body"/>
-          </p:nvPr>
-        </p:nvSpPr>
-        <p:spPr/>
-        <p:txBody>
-          <a:bodyPr/>
-          <a:lstStyle/>
-          <a:p>
-            <a:pPr lvl="0" indent="0" marL="0">
-              <a:spcBef>
-                <a:spcPts val="3000"/>
-              </a:spcBef>
-              <a:buNone/>
-            </a:pPr>
-            <a:r>
-              <a:rPr b="1"/>
-              <a:t>Características de un buen trend follower</a:t>
-            </a:r>
-          </a:p>
-          <a:p>
-            <a:pPr lvl="0"/>
-            <a:r>
-              <a:rPr/>
-              <a:t>Tiene un programa activo, con un mínimo de inversión bajo.</a:t>
-            </a:r>
-          </a:p>
-          <a:p>
-            <a:pPr lvl="0"/>
-            <a:r>
-              <a:rPr/>
-              <a:t>Tiene al menos 15 años de historia.</a:t>
-            </a:r>
-          </a:p>
-          <a:p>
-            <a:pPr lvl="0"/>
-            <a:r>
-              <a:rPr/>
-              <a:t>Trend Following es la estrategia dominante de su programa.</a:t>
-            </a:r>
-          </a:p>
-          <a:p>
-            <a:pPr lvl="0"/>
-            <a:r>
-              <a:rPr/>
-              <a:t>Es totalmente sistemático y usa reglas cuantitativas para entrar y salir de posiciones.</a:t>
-            </a:r>
-          </a:p>
-          <a:p>
-            <a:pPr lvl="0"/>
-            <a:r>
-              <a:rPr/>
-              <a:t>Está globalmente diversificado e invierte en una amplia selección de clases de activos.</a:t>
-            </a:r>
-          </a:p>
-          <a:p>
-            <a:pPr lvl="0" indent="0" marL="0">
-              <a:spcBef>
-                <a:spcPts val="3000"/>
-              </a:spcBef>
-              <a:buNone/>
-            </a:pPr>
-            <a:r>
-              <a:rPr b="1"/>
-              <a:t>Buenos Trend Followers</a:t>
-            </a:r>
-          </a:p>
-        </p:txBody>
-      </p:sp>
-      <p:pic>
-        <p:nvPicPr>
-          <p:cNvPr descr="images/top%20funds%20by%20mar%2015%20years.png" id="0" name="Picture 1"/>
-          <p:cNvPicPr>
-            <a:picLocks noGrp="1" noChangeAspect="1"/>
-          </p:cNvPicPr>
-          <p:nvPr/>
-        </p:nvPicPr>
-        <p:blipFill>
-          <a:blip r:embed="rId2"/>
-          <a:stretch>
-            <a:fillRect/>
-          </a:stretch>
-        </p:blipFill>
-        <p:spPr bwMode="auto">
-          <a:xfrm>
-            <a:off x="3568700" y="1498600"/>
-            <a:ext cx="5105400" cy="1790700"/>
-          </a:xfrm>
-          <a:prstGeom prst="rect">
-            <a:avLst/>
-          </a:prstGeom>
-          <a:noFill/>
-          <a:ln w="9525">
-            <a:noFill/>
-            <a:headEnd/>
-            <a:tailEnd/>
-          </a:ln>
-        </p:spPr>
-      </p:pic>
-    </p:spTree>
-  </p:cSld>
-</p:sld>
-</file>
-
-<file path=ppt/slides/slide8.xml><?xml version="1.0" encoding="utf-8"?>
-<p:sld xmlns:a="http://schemas.openxmlformats.org/drawingml/2006/main" xmlns:r="http://schemas.openxmlformats.org/officeDocument/2006/relationships" xmlns:p="http://schemas.openxmlformats.org/presentationml/2006/main">
-  <p:cSld>
-    <p:spTree>
-      <p:nvGrpSpPr>
-        <p:cNvPr id="1" name=""/>
-        <p:cNvGrpSpPr/>
-        <p:nvPr/>
-      </p:nvGrpSpPr>
-      <p:grpSpPr>
-        <a:xfrm>
-          <a:off x="0" y="0"/>
-          <a:ext cx="0" cy="0"/>
-          <a:chOff x="0" y="0"/>
-          <a:chExt cx="0" cy="0"/>
-        </a:xfrm>
-      </p:grpSpPr>
-      <p:sp>
-        <p:nvSpPr>
-          <p:cNvPr id="4" name="Text Placeholder 3"/>
-          <p:cNvSpPr>
-            <a:spLocks noGrp="1"/>
-          </p:cNvSpPr>
-          <p:nvPr>
-            <p:ph idx="2" sz="half" type="body"/>
-          </p:nvPr>
-        </p:nvSpPr>
-        <p:spPr/>
-        <p:txBody>
-          <a:bodyPr/>
-          <a:lstStyle/>
-          <a:p>
-            <a:pPr lvl="0" indent="0" marL="0">
-              <a:buNone/>
-            </a:pPr>
-            <a:r>
-              <a:rPr/>
-              <a:t>Estos fondos tenían 15 años de track record en el año 2000. Para cada año muestra el ranking de los 5 mejores fondos por ratio MAR.</a:t>
-            </a:r>
-          </a:p>
-          <a:p>
-            <a:pPr lvl="0" indent="0" marL="0">
-              <a:spcBef>
-                <a:spcPts val="3000"/>
-              </a:spcBef>
-              <a:buNone/>
-            </a:pPr>
-            <a:r>
-              <a:rPr b="1"/>
-              <a:t>Fondos vieja escuela</a:t>
-            </a:r>
-          </a:p>
-          <a:p>
-            <a:pPr lvl="0" indent="0" marL="0">
-              <a:buNone/>
-            </a:pPr>
-            <a:r>
-              <a:rPr/>
-              <a:t>Vieja escuela:</a:t>
-            </a:r>
-          </a:p>
-          <a:p>
-            <a:pPr lvl="0"/>
-            <a:r>
-              <a:rPr/>
-              <a:t>Ejecutan la estrategia en forma pura.</a:t>
-            </a:r>
-          </a:p>
-          <a:p>
-            <a:pPr lvl="0"/>
-            <a:r>
-              <a:rPr/>
-              <a:t>Tienen grandes movimientos.</a:t>
-            </a:r>
-          </a:p>
-          <a:p>
-            <a:pPr lvl="0"/>
-            <a:r>
-              <a:rPr/>
-              <a:t>Se diferencian en el corto plazo.</a:t>
-            </a:r>
-          </a:p>
-          <a:p>
-            <a:pPr lvl="0"/>
-            <a:r>
-              <a:rPr/>
-              <a:t>Pueden tener riesgo key-person.</a:t>
-            </a:r>
-          </a:p>
-          <a:p>
-            <a:pPr lvl="0" indent="0" marL="0">
-              <a:spcBef>
-                <a:spcPts val="3000"/>
-              </a:spcBef>
-              <a:buNone/>
-            </a:pPr>
-            <a:r>
-              <a:rPr b="1"/>
-              <a:t>Fondos institucionales</a:t>
-            </a:r>
-          </a:p>
-          <a:p>
-            <a:pPr lvl="0"/>
-            <a:r>
-              <a:rPr/>
-              <a:t>Son más predecibles</a:t>
-            </a:r>
-          </a:p>
-          <a:p>
-            <a:pPr lvl="0"/>
-            <a:r>
-              <a:rPr/>
-              <a:t>Se mueven menos</a:t>
-            </a:r>
-          </a:p>
-          <a:p>
-            <a:pPr lvl="0"/>
-            <a:r>
-              <a:rPr/>
-              <a:t>A veces se ‘quedan atrás’</a:t>
-            </a:r>
-          </a:p>
-          <a:p>
-            <a:pPr lvl="0"/>
-            <a:r>
-              <a:rPr/>
-              <a:t>La continuidad de negocio es más segura</a:t>
-            </a:r>
-          </a:p>
-          <a:p>
-            <a:pPr lvl="0" indent="0" marL="0">
-              <a:spcBef>
-                <a:spcPts val="3000"/>
-              </a:spcBef>
-              <a:buNone/>
-            </a:pPr>
-            <a:r>
-              <a:rPr b="1"/>
-              <a:t>Managers grandes: negocio</a:t>
-            </a:r>
-          </a:p>
-          <a:p>
-            <a:pPr lvl="0" indent="0" marL="0">
-              <a:buNone/>
-            </a:pPr>
-            <a:r>
-              <a:rPr/>
-              <a:t>Sobre un total de $140 billones de dólares</a:t>
-            </a:r>
-          </a:p>
-        </p:txBody>
-      </p:sp>
-      <p:pic>
-        <p:nvPicPr>
-          <p:cNvPr descr="images/managers%20grandes.png" id="0" name="Picture 1"/>
-          <p:cNvPicPr>
-            <a:picLocks noGrp="1" noChangeAspect="1"/>
-          </p:cNvPicPr>
-          <p:nvPr/>
-        </p:nvPicPr>
-        <p:blipFill>
-          <a:blip r:embed="rId2"/>
-          <a:stretch>
-            <a:fillRect/>
-          </a:stretch>
-        </p:blipFill>
-        <p:spPr bwMode="auto">
-          <a:xfrm>
-            <a:off x="3568700" y="1333500"/>
-            <a:ext cx="5105400" cy="2120900"/>
-          </a:xfrm>
-          <a:prstGeom prst="rect">
-            <a:avLst/>
-          </a:prstGeom>
-          <a:noFill/>
-          <a:ln w="9525">
-            <a:noFill/>
-            <a:headEnd/>
-            <a:tailEnd/>
-          </a:ln>
-        </p:spPr>
-      </p:pic>
-    </p:spTree>
-  </p:cSld>
-</p:sld>
-</file>
-
 <file path=ppt/slides/slide9.xml><?xml version="1.0" encoding="utf-8"?>
 <p:sld xmlns:a="http://schemas.openxmlformats.org/drawingml/2006/main" xmlns:r="http://schemas.openxmlformats.org/officeDocument/2006/relationships" xmlns:p="http://schemas.openxmlformats.org/presentationml/2006/main">
   <p:cSld>
@@ -4730,12 +5448,12 @@
       </p:grpSpPr>
       <p:sp>
         <p:nvSpPr>
-          <p:cNvPr id="4" name="Text Placeholder 3"/>
-          <p:cNvSpPr>
-            <a:spLocks noGrp="1"/>
-          </p:cNvSpPr>
-          <p:nvPr>
-            <p:ph idx="2" sz="half" type="body"/>
+          <p:cNvPr id="2" name="Title 1"/>
+          <p:cNvSpPr>
+            <a:spLocks noGrp="1"/>
+          </p:cNvSpPr>
+          <p:nvPr>
+            <p:ph type="title"/>
           </p:nvPr>
         </p:nvSpPr>
         <p:spPr/>
@@ -4744,21 +5462,18 @@
           <a:lstStyle/>
           <a:p>
             <a:pPr lvl="0" indent="0" marL="0">
-              <a:spcBef>
-                <a:spcPts val="3000"/>
-              </a:spcBef>
               <a:buNone/>
             </a:pPr>
             <a:r>
-              <a:rPr b="1"/>
-              <a:t>Managers grandes: sus fondos</a:t>
+              <a:rPr/>
+              <a:t>Efectos sobre un portafolio</a:t>
             </a:r>
           </a:p>
         </p:txBody>
       </p:sp>
       <p:pic>
         <p:nvPicPr>
-          <p:cNvPr descr="images/big%20managers.png" id="0" name="Picture 1"/>
+          <p:cNvPr descr="images/efecto%20de%20mezclar%20el%20benchmark%20con%20trend%20following.png" id="0" name="Picture 1"/>
           <p:cNvPicPr>
             <a:picLocks noGrp="1" noChangeAspect="1"/>
           </p:cNvPicPr>
@@ -4772,8 +5487,8 @@
         </p:blipFill>
         <p:spPr bwMode="auto">
           <a:xfrm>
-            <a:off x="3568700" y="711200"/>
-            <a:ext cx="5105400" cy="3365500"/>
+            <a:off x="2146300" y="1193800"/>
+            <a:ext cx="4838700" cy="3390900"/>
           </a:xfrm>
           <a:prstGeom prst="rect">
             <a:avLst/>

</xml_diff>

<commit_message>
Added new fee analysis
</commit_message>
<xml_diff>
--- a/presentations/powerpoint output.pptx
+++ b/presentations/powerpoint output.pptx
@@ -37,6 +37,10 @@
     <p:sldId id="285" r:id="rId31"/>
     <p:sldId id="286" r:id="rId32"/>
     <p:sldId id="287" r:id="rId33"/>
+    <p:sldId id="288" r:id="rId34"/>
+    <p:sldId id="289" r:id="rId35"/>
+    <p:sldId id="290" r:id="rId36"/>
+    <p:sldId id="291" r:id="rId37"/>
   </p:sldIdLst>
   <p:sldSz cx="9144000" cy="5143500" type="screen16x9"/>
   <p:notesSz cx="6858000" cy="9144000"/>
@@ -3146,7 +3150,7 @@
             </a:pPr>
             <a:r>
               <a:rPr/>
-              <a:t>Agregar Trend Following a un portafolio</a:t>
+              <a:t>ppt formatted presentation</a:t>
             </a:r>
           </a:p>
         </p:txBody>
@@ -3185,6 +3189,83 @@
 </file>
 
 <file path=ppt/slides/slide10.xml><?xml version="1.0" encoding="utf-8"?>
+<p:sld xmlns:a="http://schemas.openxmlformats.org/drawingml/2006/main" xmlns:r="http://schemas.openxmlformats.org/officeDocument/2006/relationships" xmlns:p="http://schemas.openxmlformats.org/presentationml/2006/main">
+  <p:cSld>
+    <p:spTree>
+      <p:nvGrpSpPr>
+        <p:cNvPr id="1" name=""/>
+        <p:cNvGrpSpPr/>
+        <p:nvPr/>
+      </p:nvGrpSpPr>
+      <p:grpSpPr>
+        <a:xfrm>
+          <a:off x="0" y="0"/>
+          <a:ext cx="0" cy="0"/>
+          <a:chOff x="0" y="0"/>
+          <a:chExt cx="0" cy="0"/>
+        </a:xfrm>
+      </p:grpSpPr>
+      <p:sp>
+        <p:nvSpPr>
+          <p:cNvPr id="2" name="Title 1"/>
+          <p:cNvSpPr>
+            <a:spLocks noGrp="1"/>
+          </p:cNvSpPr>
+          <p:nvPr>
+            <p:ph type="title"/>
+          </p:nvPr>
+        </p:nvSpPr>
+        <p:spPr/>
+        <p:txBody>
+          <a:bodyPr/>
+          <a:lstStyle/>
+          <a:p>
+            <a:pPr lvl="0" indent="0" marL="0">
+              <a:buNone/>
+            </a:pPr>
+            <a:r>
+              <a:rPr/>
+              <a:t>Efectos sobre un portafolio</a:t>
+            </a:r>
+          </a:p>
+        </p:txBody>
+      </p:sp>
+      <p:pic>
+        <p:nvPicPr>
+          <p:cNvPr descr="images/efecto%20de%20mezclar%20el%20benchmark%20con%20trend%20following.png" id="0" name="Picture 1"/>
+          <p:cNvPicPr>
+            <a:picLocks noGrp="1" noChangeAspect="1"/>
+          </p:cNvPicPr>
+          <p:nvPr/>
+        </p:nvPicPr>
+        <p:blipFill>
+          <a:blip r:embed="rId2"/>
+          <a:stretch>
+            <a:fillRect/>
+          </a:stretch>
+        </p:blipFill>
+        <p:spPr bwMode="auto">
+          <a:xfrm>
+            <a:off x="2146300" y="1193800"/>
+            <a:ext cx="4838700" cy="3390900"/>
+          </a:xfrm>
+          <a:prstGeom prst="rect">
+            <a:avLst/>
+          </a:prstGeom>
+          <a:noFill/>
+          <a:ln w="9525">
+            <a:noFill/>
+            <a:headEnd/>
+            <a:tailEnd/>
+          </a:ln>
+        </p:spPr>
+      </p:pic>
+    </p:spTree>
+  </p:cSld>
+</p:sld>
+</file>
+
+<file path=ppt/slides/slide11.xml><?xml version="1.0" encoding="utf-8"?>
 <p:sld xmlns:a="http://schemas.openxmlformats.org/drawingml/2006/main" xmlns:r="http://schemas.openxmlformats.org/officeDocument/2006/relationships" xmlns:p="http://schemas.openxmlformats.org/presentationml/2006/main">
   <p:cSld>
     <p:spTree>
@@ -3261,7 +3342,7 @@
 </p:sld>
 </file>
 
-<file path=ppt/slides/slide11.xml><?xml version="1.0" encoding="utf-8"?>
+<file path=ppt/slides/slide12.xml><?xml version="1.0" encoding="utf-8"?>
 <p:sld xmlns:a="http://schemas.openxmlformats.org/drawingml/2006/main" xmlns:r="http://schemas.openxmlformats.org/officeDocument/2006/relationships" xmlns:p="http://schemas.openxmlformats.org/presentationml/2006/main">
   <p:cSld>
     <p:spTree>
@@ -3359,7 +3440,7 @@
 </p:sld>
 </file>
 
-<file path=ppt/slides/slide12.xml><?xml version="1.0" encoding="utf-8"?>
+<file path=ppt/slides/slide13.xml><?xml version="1.0" encoding="utf-8"?>
 <p:sld xmlns:a="http://schemas.openxmlformats.org/drawingml/2006/main" xmlns:r="http://schemas.openxmlformats.org/officeDocument/2006/relationships" xmlns:p="http://schemas.openxmlformats.org/presentationml/2006/main">
   <p:cSld>
     <p:spTree>
@@ -3436,53 +3517,6 @@
 </p:sld>
 </file>
 
-<file path=ppt/slides/slide13.xml><?xml version="1.0" encoding="utf-8"?>
-<p:sld xmlns:a="http://schemas.openxmlformats.org/drawingml/2006/main" xmlns:r="http://schemas.openxmlformats.org/officeDocument/2006/relationships" xmlns:p="http://schemas.openxmlformats.org/presentationml/2006/main">
-  <p:cSld>
-    <p:spTree>
-      <p:nvGrpSpPr>
-        <p:cNvPr id="1" name=""/>
-        <p:cNvGrpSpPr/>
-        <p:nvPr/>
-      </p:nvGrpSpPr>
-      <p:grpSpPr>
-        <a:xfrm>
-          <a:off x="0" y="0"/>
-          <a:ext cx="0" cy="0"/>
-          <a:chOff x="0" y="0"/>
-          <a:chExt cx="0" cy="0"/>
-        </a:xfrm>
-      </p:grpSpPr>
-      <p:sp>
-        <p:nvSpPr>
-          <p:cNvPr id="3" name="Content Placeholder 2"/>
-          <p:cNvSpPr>
-            <a:spLocks noGrp="1"/>
-          </p:cNvSpPr>
-          <p:nvPr>
-            <p:ph idx="1"/>
-          </p:nvPr>
-        </p:nvSpPr>
-        <p:spPr/>
-        <p:txBody>
-          <a:bodyPr/>
-          <a:lstStyle/>
-          <a:p>
-            <a:pPr lvl="0" indent="0" marL="0">
-              <a:buNone/>
-            </a:pPr>
-            <a:r>
-              <a:rPr/>
-              <a:t>Estos fondos tenían 15 años de track record en el año 2000. Para cada año muestra el ranking de los 5 mejores fondos por ratio MAR.</a:t>
-            </a:r>
-          </a:p>
-        </p:txBody>
-      </p:sp>
-    </p:spTree>
-  </p:cSld>
-</p:sld>
-</file>
-
 <file path=ppt/slides/slide14.xml><?xml version="1.0" encoding="utf-8"?>
 <p:sld xmlns:a="http://schemas.openxmlformats.org/drawingml/2006/main" xmlns:r="http://schemas.openxmlformats.org/officeDocument/2006/relationships" xmlns:p="http://schemas.openxmlformats.org/presentationml/2006/main">
   <p:cSld>
@@ -3502,12 +3536,12 @@
       </p:grpSpPr>
       <p:sp>
         <p:nvSpPr>
-          <p:cNvPr id="2" name="Title 1"/>
-          <p:cNvSpPr>
-            <a:spLocks noGrp="1"/>
-          </p:cNvSpPr>
-          <p:nvPr>
-            <p:ph type="title"/>
+          <p:cNvPr id="3" name="Content Placeholder 2"/>
+          <p:cNvSpPr>
+            <a:spLocks noGrp="1"/>
+          </p:cNvSpPr>
+          <p:nvPr>
+            <p:ph idx="1"/>
           </p:nvPr>
         </p:nvSpPr>
         <p:spPr/>
@@ -3520,60 +3554,7 @@
             </a:pPr>
             <a:r>
               <a:rPr/>
-              <a:t>Fondos vieja escuela</a:t>
-            </a:r>
-          </a:p>
-        </p:txBody>
-      </p:sp>
-      <p:sp>
-        <p:nvSpPr>
-          <p:cNvPr id="3" name="Content Placeholder 2"/>
-          <p:cNvSpPr>
-            <a:spLocks noGrp="1"/>
-          </p:cNvSpPr>
-          <p:nvPr>
-            <p:ph idx="1"/>
-          </p:nvPr>
-        </p:nvSpPr>
-        <p:spPr/>
-        <p:txBody>
-          <a:bodyPr/>
-          <a:lstStyle/>
-          <a:p>
-            <a:pPr lvl="0" indent="0" marL="0">
-              <a:buNone/>
-            </a:pPr>
-            <a:r>
-              <a:rPr/>
-              <a:t>Vieja escuela:</a:t>
-            </a:r>
-          </a:p>
-          <a:p>
-            <a:pPr lvl="0"/>
-            <a:r>
-              <a:rPr/>
-              <a:t>Ejecutan la estrategia en forma pura.</a:t>
-            </a:r>
-          </a:p>
-          <a:p>
-            <a:pPr lvl="0"/>
-            <a:r>
-              <a:rPr/>
-              <a:t>Tienen grandes movimientos.</a:t>
-            </a:r>
-          </a:p>
-          <a:p>
-            <a:pPr lvl="0"/>
-            <a:r>
-              <a:rPr/>
-              <a:t>Se diferencian en el corto plazo.</a:t>
-            </a:r>
-          </a:p>
-          <a:p>
-            <a:pPr lvl="0"/>
-            <a:r>
-              <a:rPr/>
-              <a:t>Pueden tener riesgo key-person.</a:t>
+              <a:t>Estos fondos tenían 15 años de track record en el año 2000. Para cada año muestra el ranking de los 5 mejores fondos por ratio MAR.</a:t>
             </a:r>
           </a:p>
         </p:txBody>
@@ -3620,7 +3601,7 @@
             </a:pPr>
             <a:r>
               <a:rPr/>
-              <a:t>Fondos institucionales</a:t>
+              <a:t>Fondos vieja escuela</a:t>
             </a:r>
           </a:p>
         </p:txBody>
@@ -3640,31 +3621,40 @@
           <a:bodyPr/>
           <a:lstStyle/>
           <a:p>
+            <a:pPr lvl="0" indent="0" marL="0">
+              <a:buNone/>
+            </a:pPr>
+            <a:r>
+              <a:rPr/>
+              <a:t>Vieja escuela:</a:t>
+            </a:r>
+          </a:p>
+          <a:p>
             <a:pPr lvl="0"/>
             <a:r>
               <a:rPr/>
-              <a:t>Son más predecibles</a:t>
+              <a:t>Ejecutan la estrategia en forma pura.</a:t>
             </a:r>
           </a:p>
           <a:p>
             <a:pPr lvl="0"/>
             <a:r>
               <a:rPr/>
-              <a:t>Se mueven menos</a:t>
+              <a:t>Tienen grandes movimientos.</a:t>
             </a:r>
           </a:p>
           <a:p>
             <a:pPr lvl="0"/>
             <a:r>
               <a:rPr/>
-              <a:t>A veces se ‘quedan atrás’</a:t>
+              <a:t>Se diferencian en el corto plazo.</a:t>
             </a:r>
           </a:p>
           <a:p>
             <a:pPr lvl="0"/>
             <a:r>
               <a:rPr/>
-              <a:t>La continuidad de negocio es más segura</a:t>
+              <a:t>Pueden tener riesgo key-person.</a:t>
             </a:r>
           </a:p>
         </p:txBody>
@@ -3675,6 +3665,97 @@
 </file>
 
 <file path=ppt/slides/slide16.xml><?xml version="1.0" encoding="utf-8"?>
+<p:sld xmlns:a="http://schemas.openxmlformats.org/drawingml/2006/main" xmlns:r="http://schemas.openxmlformats.org/officeDocument/2006/relationships" xmlns:p="http://schemas.openxmlformats.org/presentationml/2006/main">
+  <p:cSld>
+    <p:spTree>
+      <p:nvGrpSpPr>
+        <p:cNvPr id="1" name=""/>
+        <p:cNvGrpSpPr/>
+        <p:nvPr/>
+      </p:nvGrpSpPr>
+      <p:grpSpPr>
+        <a:xfrm>
+          <a:off x="0" y="0"/>
+          <a:ext cx="0" cy="0"/>
+          <a:chOff x="0" y="0"/>
+          <a:chExt cx="0" cy="0"/>
+        </a:xfrm>
+      </p:grpSpPr>
+      <p:sp>
+        <p:nvSpPr>
+          <p:cNvPr id="2" name="Title 1"/>
+          <p:cNvSpPr>
+            <a:spLocks noGrp="1"/>
+          </p:cNvSpPr>
+          <p:nvPr>
+            <p:ph type="title"/>
+          </p:nvPr>
+        </p:nvSpPr>
+        <p:spPr/>
+        <p:txBody>
+          <a:bodyPr/>
+          <a:lstStyle/>
+          <a:p>
+            <a:pPr lvl="0" indent="0" marL="0">
+              <a:buNone/>
+            </a:pPr>
+            <a:r>
+              <a:rPr/>
+              <a:t>Fondos institucionales</a:t>
+            </a:r>
+          </a:p>
+        </p:txBody>
+      </p:sp>
+      <p:sp>
+        <p:nvSpPr>
+          <p:cNvPr id="3" name="Content Placeholder 2"/>
+          <p:cNvSpPr>
+            <a:spLocks noGrp="1"/>
+          </p:cNvSpPr>
+          <p:nvPr>
+            <p:ph idx="1"/>
+          </p:nvPr>
+        </p:nvSpPr>
+        <p:spPr/>
+        <p:txBody>
+          <a:bodyPr/>
+          <a:lstStyle/>
+          <a:p>
+            <a:pPr lvl="0"/>
+            <a:r>
+              <a:rPr/>
+              <a:t>Son más predecibles</a:t>
+            </a:r>
+          </a:p>
+          <a:p>
+            <a:pPr lvl="0"/>
+            <a:r>
+              <a:rPr/>
+              <a:t>Se mueven menos</a:t>
+            </a:r>
+          </a:p>
+          <a:p>
+            <a:pPr lvl="0"/>
+            <a:r>
+              <a:rPr/>
+              <a:t>A veces se ‘quedan atrás’</a:t>
+            </a:r>
+          </a:p>
+          <a:p>
+            <a:pPr lvl="0"/>
+            <a:r>
+              <a:rPr/>
+              <a:t>La continuidad de negocio es más segura</a:t>
+            </a:r>
+          </a:p>
+        </p:txBody>
+      </p:sp>
+    </p:spTree>
+  </p:cSld>
+</p:sld>
+</file>
+
+<file path=ppt/slides/slide17.xml><?xml version="1.0" encoding="utf-8"?>
 <p:sld xmlns:a="http://schemas.openxmlformats.org/drawingml/2006/main" xmlns:r="http://schemas.openxmlformats.org/officeDocument/2006/relationships" xmlns:p="http://schemas.openxmlformats.org/presentationml/2006/main">
   <p:cSld>
     <p:spTree>
@@ -3781,7 +3862,7 @@
 </p:sld>
 </file>
 
-<file path=ppt/slides/slide17.xml><?xml version="1.0" encoding="utf-8"?>
+<file path=ppt/slides/slide18.xml><?xml version="1.0" encoding="utf-8"?>
 <p:sld xmlns:a="http://schemas.openxmlformats.org/drawingml/2006/main" xmlns:r="http://schemas.openxmlformats.org/officeDocument/2006/relationships" xmlns:p="http://schemas.openxmlformats.org/presentationml/2006/main">
   <p:cSld>
     <p:spTree>
@@ -3858,7 +3939,7 @@
 </p:sld>
 </file>
 
-<file path=ppt/slides/slide18.xml><?xml version="1.0" encoding="utf-8"?>
+<file path=ppt/slides/slide19.xml><?xml version="1.0" encoding="utf-8"?>
 <p:sld xmlns:a="http://schemas.openxmlformats.org/drawingml/2006/main" xmlns:r="http://schemas.openxmlformats.org/officeDocument/2006/relationships" xmlns:p="http://schemas.openxmlformats.org/presentationml/2006/main">
   <p:cSld>
     <p:spTree>
@@ -3930,7 +4011,98 @@
 </p:sld>
 </file>
 
-<file path=ppt/slides/slide19.xml><?xml version="1.0" encoding="utf-8"?>
+<file path=ppt/slides/slide2.xml><?xml version="1.0" encoding="utf-8"?>
+<p:sld xmlns:a="http://schemas.openxmlformats.org/drawingml/2006/main" xmlns:r="http://schemas.openxmlformats.org/officeDocument/2006/relationships" xmlns:p="http://schemas.openxmlformats.org/presentationml/2006/main">
+  <p:cSld>
+    <p:spTree>
+      <p:nvGrpSpPr>
+        <p:cNvPr id="1" name=""/>
+        <p:cNvGrpSpPr/>
+        <p:nvPr/>
+      </p:nvGrpSpPr>
+      <p:grpSpPr>
+        <a:xfrm>
+          <a:off x="0" y="0"/>
+          <a:ext cx="0" cy="0"/>
+          <a:chOff x="0" y="0"/>
+          <a:chExt cx="0" cy="0"/>
+        </a:xfrm>
+      </p:grpSpPr>
+      <p:sp>
+        <p:nvSpPr>
+          <p:cNvPr id="2" name="Title 1"/>
+          <p:cNvSpPr>
+            <a:spLocks noGrp="1"/>
+          </p:cNvSpPr>
+          <p:nvPr>
+            <p:ph type="title"/>
+          </p:nvPr>
+        </p:nvSpPr>
+        <p:spPr/>
+        <p:txBody>
+          <a:bodyPr/>
+          <a:lstStyle/>
+          <a:p>
+            <a:pPr lvl="0" indent="0" marL="0">
+              <a:buNone/>
+            </a:pPr>
+            <a:r>
+              <a:rPr/>
+              <a:t>Conclusiones</a:t>
+            </a:r>
+          </a:p>
+        </p:txBody>
+      </p:sp>
+      <p:sp>
+        <p:nvSpPr>
+          <p:cNvPr id="3" name="Content Placeholder 2"/>
+          <p:cNvSpPr>
+            <a:spLocks noGrp="1"/>
+          </p:cNvSpPr>
+          <p:nvPr>
+            <p:ph idx="1"/>
+          </p:nvPr>
+        </p:nvSpPr>
+        <p:spPr/>
+        <p:txBody>
+          <a:bodyPr/>
+          <a:lstStyle/>
+          <a:p>
+            <a:pPr lvl="0"/>
+            <a:r>
+              <a:rPr/>
+              <a:t>Trend Following mejora el retorno y el riesgo de un portafolio ‘buy and hold’.</a:t>
+            </a:r>
+          </a:p>
+          <a:p>
+            <a:pPr lvl="0"/>
+            <a:r>
+              <a:rPr/>
+              <a:t>La selección de un manager depende del objetivo: a) tener Trend Following o b) cubrir riesgos de accidente.</a:t>
+            </a:r>
+          </a:p>
+          <a:p>
+            <a:pPr lvl="0"/>
+            <a:r>
+              <a:rPr/>
+              <a:t>Hay dos tipos de managers: ‘vieja escuela’ e ‘institucionales’.</a:t>
+            </a:r>
+          </a:p>
+          <a:p>
+            <a:pPr lvl="0"/>
+            <a:r>
+              <a:rPr/>
+              <a:t>De acuerdo al tipo de manager es el porcentaje del portafolio a invertir.</a:t>
+            </a:r>
+          </a:p>
+        </p:txBody>
+      </p:sp>
+    </p:spTree>
+  </p:cSld>
+</p:sld>
+</file>
+
+<file path=ppt/slides/slide20.xml><?xml version="1.0" encoding="utf-8"?>
 <p:sld xmlns:a="http://schemas.openxmlformats.org/drawingml/2006/main" xmlns:r="http://schemas.openxmlformats.org/officeDocument/2006/relationships" xmlns:p="http://schemas.openxmlformats.org/presentationml/2006/main">
   <p:cSld>
     <p:spTree>
@@ -4007,144 +4179,6 @@
 </p:sld>
 </file>
 
-<file path=ppt/slides/slide2.xml><?xml version="1.0" encoding="utf-8"?>
-<p:sld xmlns:a="http://schemas.openxmlformats.org/drawingml/2006/main" xmlns:r="http://schemas.openxmlformats.org/officeDocument/2006/relationships" xmlns:p="http://schemas.openxmlformats.org/presentationml/2006/main">
-  <p:cSld>
-    <p:spTree>
-      <p:nvGrpSpPr>
-        <p:cNvPr id="1" name=""/>
-        <p:cNvGrpSpPr/>
-        <p:nvPr/>
-      </p:nvGrpSpPr>
-      <p:grpSpPr>
-        <a:xfrm>
-          <a:off x="0" y="0"/>
-          <a:ext cx="0" cy="0"/>
-          <a:chOff x="0" y="0"/>
-          <a:chExt cx="0" cy="0"/>
-        </a:xfrm>
-      </p:grpSpPr>
-      <p:sp>
-        <p:nvSpPr>
-          <p:cNvPr id="2" name="Title 1"/>
-          <p:cNvSpPr>
-            <a:spLocks noGrp="1"/>
-          </p:cNvSpPr>
-          <p:nvPr>
-            <p:ph type="title"/>
-          </p:nvPr>
-        </p:nvSpPr>
-        <p:spPr/>
-        <p:txBody>
-          <a:bodyPr/>
-          <a:lstStyle/>
-          <a:p>
-            <a:pPr lvl="0" indent="0" marL="0">
-              <a:buNone/>
-            </a:pPr>
-            <a:r>
-              <a:rPr/>
-              <a:t>Conclusiones</a:t>
-            </a:r>
-          </a:p>
-        </p:txBody>
-      </p:sp>
-      <p:sp>
-        <p:nvSpPr>
-          <p:cNvPr id="3" name="Content Placeholder 2"/>
-          <p:cNvSpPr>
-            <a:spLocks noGrp="1"/>
-          </p:cNvSpPr>
-          <p:nvPr>
-            <p:ph idx="1"/>
-          </p:nvPr>
-        </p:nvSpPr>
-        <p:spPr/>
-        <p:txBody>
-          <a:bodyPr/>
-          <a:lstStyle/>
-          <a:p>
-            <a:pPr lvl="0"/>
-            <a:r>
-              <a:rPr/>
-              <a:t>Trend Following mejora el retorno y el riesgo de un portafolio ‘buy and hold’.</a:t>
-            </a:r>
-          </a:p>
-          <a:p>
-            <a:pPr lvl="0"/>
-            <a:r>
-              <a:rPr/>
-              <a:t>La selección de un manager depende del objetivo: a) tener Trend Following o b) cubrir riesgos de accidente.</a:t>
-            </a:r>
-          </a:p>
-          <a:p>
-            <a:pPr lvl="0"/>
-            <a:r>
-              <a:rPr/>
-              <a:t>Hay dos tipos de managers: ‘vieja escuela’ e ‘institucionales’.</a:t>
-            </a:r>
-          </a:p>
-          <a:p>
-            <a:pPr lvl="0"/>
-            <a:r>
-              <a:rPr/>
-              <a:t>De acuerdo al tipo de manager es el porcentaje del portafolio a invertir.</a:t>
-            </a:r>
-          </a:p>
-        </p:txBody>
-      </p:sp>
-    </p:spTree>
-  </p:cSld>
-</p:sld>
-</file>
-
-<file path=ppt/slides/slide20.xml><?xml version="1.0" encoding="utf-8"?>
-<p:sld xmlns:a="http://schemas.openxmlformats.org/drawingml/2006/main" xmlns:r="http://schemas.openxmlformats.org/officeDocument/2006/relationships" xmlns:p="http://schemas.openxmlformats.org/presentationml/2006/main">
-  <p:cSld>
-    <p:spTree>
-      <p:nvGrpSpPr>
-        <p:cNvPr id="1" name=""/>
-        <p:cNvGrpSpPr/>
-        <p:nvPr/>
-      </p:nvGrpSpPr>
-      <p:grpSpPr>
-        <a:xfrm>
-          <a:off x="0" y="0"/>
-          <a:ext cx="0" cy="0"/>
-          <a:chOff x="0" y="0"/>
-          <a:chExt cx="0" cy="0"/>
-        </a:xfrm>
-      </p:grpSpPr>
-      <p:sp>
-        <p:nvSpPr>
-          <p:cNvPr id="3" name="Content Placeholder 2"/>
-          <p:cNvSpPr>
-            <a:spLocks noGrp="1"/>
-          </p:cNvSpPr>
-          <p:nvPr>
-            <p:ph idx="1"/>
-          </p:nvPr>
-        </p:nvSpPr>
-        <p:spPr/>
-        <p:txBody>
-          <a:bodyPr/>
-          <a:lstStyle/>
-          <a:p>
-            <a:pPr lvl="0" indent="0" marL="0">
-              <a:buNone/>
-            </a:pPr>
-            <a:r>
-              <a:rPr/>
-              <a:t>Los fondos más volátiles pierden muchos activos en momentos de caída.</a:t>
-            </a:r>
-          </a:p>
-        </p:txBody>
-      </p:sp>
-    </p:spTree>
-  </p:cSld>
-</p:sld>
-</file>
-
 <file path=ppt/slides/slide21.xml><?xml version="1.0" encoding="utf-8"?>
 <p:sld xmlns:a="http://schemas.openxmlformats.org/drawingml/2006/main" xmlns:r="http://schemas.openxmlformats.org/officeDocument/2006/relationships" xmlns:p="http://schemas.openxmlformats.org/presentationml/2006/main">
   <p:cSld>
@@ -4164,12 +4198,12 @@
       </p:grpSpPr>
       <p:sp>
         <p:nvSpPr>
-          <p:cNvPr id="2" name="Title 1"/>
-          <p:cNvSpPr>
-            <a:spLocks noGrp="1"/>
-          </p:cNvSpPr>
-          <p:nvPr>
-            <p:ph type="title"/>
+          <p:cNvPr id="3" name="Content Placeholder 2"/>
+          <p:cNvSpPr>
+            <a:spLocks noGrp="1"/>
+          </p:cNvSpPr>
+          <p:nvPr>
+            <p:ph idx="1"/>
           </p:nvPr>
         </p:nvSpPr>
         <p:spPr/>
@@ -4182,83 +4216,7 @@
             </a:pPr>
             <a:r>
               <a:rPr/>
-              <a:t>Riesgo de negocio: efecto en el retorno ($100)</a:t>
-            </a:r>
-          </a:p>
-        </p:txBody>
-      </p:sp>
-      <p:sp>
-        <p:nvSpPr>
-          <p:cNvPr id="3" name="Content Placeholder 2"/>
-          <p:cNvSpPr>
-            <a:spLocks noGrp="1"/>
-          </p:cNvSpPr>
-          <p:nvPr>
-            <p:ph idx="1"/>
-          </p:nvPr>
-        </p:nvSpPr>
-        <p:spPr/>
-        <p:txBody>
-          <a:bodyPr/>
-          <a:lstStyle/>
-          <a:p>
-            <a:pPr lvl="0"/>
-            <a:r>
-              <a:rPr/>
-              <a:t>ESCENARIO A: Mismo manager</a:t>
-            </a:r>
-          </a:p>
-          <a:p>
-            <a:pPr lvl="1"/>
-            <a:r>
-              <a:rPr/>
-              <a:t>Resultado de -$20 + Resultado de +$20 = $100</a:t>
-            </a:r>
-          </a:p>
-          <a:p>
-            <a:pPr lvl="0"/>
-            <a:r>
-              <a:rPr/>
-              <a:t>ESCENARIO B: Cambio de manager</a:t>
-            </a:r>
-          </a:p>
-          <a:p>
-            <a:pPr lvl="1"/>
-            <a:r>
-              <a:rPr/>
-              <a:t>Resultado de -$20 -&gt;</a:t>
-            </a:r>
-          </a:p>
-          <a:p>
-            <a:pPr lvl="1"/>
-            <a:r>
-              <a:rPr/>
-              <a:t>Cambio de manager</a:t>
-            </a:r>
-          </a:p>
-          <a:p>
-            <a:pPr lvl="1"/>
-            <a:r>
-              <a:rPr/>
-              <a:t>Resultado de +20 - success fee de $4 nuevo manager = $96</a:t>
-            </a:r>
-          </a:p>
-          <a:p>
-            <a:pPr lvl="0" indent="0" marL="0">
-              <a:buNone/>
-            </a:pPr>
-            <a:r>
-              <a:rPr/>
-              <a:t>Supone un success fee del 20%.</a:t>
-            </a:r>
-          </a:p>
-          <a:p>
-            <a:pPr lvl="0" indent="0" marL="0">
-              <a:buNone/>
-            </a:pPr>
-            <a:r>
-              <a:rPr/>
-              <a:t>Al cambiar de manager se pierde el ‘high watermark’.</a:t>
+              <a:t>Los fondos más volátiles pierden muchos activos en momentos de caída.</a:t>
             </a:r>
           </a:p>
         </p:txBody>
@@ -4269,6 +4227,129 @@
 </file>
 
 <file path=ppt/slides/slide22.xml><?xml version="1.0" encoding="utf-8"?>
+<p:sld xmlns:a="http://schemas.openxmlformats.org/drawingml/2006/main" xmlns:r="http://schemas.openxmlformats.org/officeDocument/2006/relationships" xmlns:p="http://schemas.openxmlformats.org/presentationml/2006/main">
+  <p:cSld>
+    <p:spTree>
+      <p:nvGrpSpPr>
+        <p:cNvPr id="1" name=""/>
+        <p:cNvGrpSpPr/>
+        <p:nvPr/>
+      </p:nvGrpSpPr>
+      <p:grpSpPr>
+        <a:xfrm>
+          <a:off x="0" y="0"/>
+          <a:ext cx="0" cy="0"/>
+          <a:chOff x="0" y="0"/>
+          <a:chExt cx="0" cy="0"/>
+        </a:xfrm>
+      </p:grpSpPr>
+      <p:sp>
+        <p:nvSpPr>
+          <p:cNvPr id="2" name="Title 1"/>
+          <p:cNvSpPr>
+            <a:spLocks noGrp="1"/>
+          </p:cNvSpPr>
+          <p:nvPr>
+            <p:ph type="title"/>
+          </p:nvPr>
+        </p:nvSpPr>
+        <p:spPr/>
+        <p:txBody>
+          <a:bodyPr/>
+          <a:lstStyle/>
+          <a:p>
+            <a:pPr lvl="0" indent="0" marL="0">
+              <a:buNone/>
+            </a:pPr>
+            <a:r>
+              <a:rPr/>
+              <a:t>Riesgo de negocio: efecto en el retorno ($100)</a:t>
+            </a:r>
+          </a:p>
+        </p:txBody>
+      </p:sp>
+      <p:sp>
+        <p:nvSpPr>
+          <p:cNvPr id="3" name="Content Placeholder 2"/>
+          <p:cNvSpPr>
+            <a:spLocks noGrp="1"/>
+          </p:cNvSpPr>
+          <p:nvPr>
+            <p:ph idx="1"/>
+          </p:nvPr>
+        </p:nvSpPr>
+        <p:spPr/>
+        <p:txBody>
+          <a:bodyPr/>
+          <a:lstStyle/>
+          <a:p>
+            <a:pPr lvl="0"/>
+            <a:r>
+              <a:rPr/>
+              <a:t>ESCENARIO A: Mismo manager</a:t>
+            </a:r>
+          </a:p>
+          <a:p>
+            <a:pPr lvl="1"/>
+            <a:r>
+              <a:rPr/>
+              <a:t>Resultado de -$20 + Resultado de +$20 = $100</a:t>
+            </a:r>
+          </a:p>
+          <a:p>
+            <a:pPr lvl="0"/>
+            <a:r>
+              <a:rPr/>
+              <a:t>ESCENARIO B: Cambio de manager</a:t>
+            </a:r>
+          </a:p>
+          <a:p>
+            <a:pPr lvl="1"/>
+            <a:r>
+              <a:rPr/>
+              <a:t>Resultado de -$20 -&gt;</a:t>
+            </a:r>
+          </a:p>
+          <a:p>
+            <a:pPr lvl="1"/>
+            <a:r>
+              <a:rPr/>
+              <a:t>Cambio de manager</a:t>
+            </a:r>
+          </a:p>
+          <a:p>
+            <a:pPr lvl="1"/>
+            <a:r>
+              <a:rPr/>
+              <a:t>Resultado de +20 - success fee de $4 nuevo manager = $96</a:t>
+            </a:r>
+          </a:p>
+          <a:p>
+            <a:pPr lvl="0" indent="0" marL="0">
+              <a:buNone/>
+            </a:pPr>
+            <a:r>
+              <a:rPr/>
+              <a:t>Supone un success fee del 20%.</a:t>
+            </a:r>
+          </a:p>
+          <a:p>
+            <a:pPr lvl="0" indent="0" marL="0">
+              <a:buNone/>
+            </a:pPr>
+            <a:r>
+              <a:rPr/>
+              <a:t>Al cambiar de manager se pierde el ‘high watermark’.</a:t>
+            </a:r>
+          </a:p>
+        </p:txBody>
+      </p:sp>
+    </p:spTree>
+  </p:cSld>
+</p:sld>
+</file>
+
+<file path=ppt/slides/slide23.xml><?xml version="1.0" encoding="utf-8"?>
 <p:sld xmlns:a="http://schemas.openxmlformats.org/drawingml/2006/main" xmlns:r="http://schemas.openxmlformats.org/officeDocument/2006/relationships" xmlns:p="http://schemas.openxmlformats.org/presentationml/2006/main">
   <p:cSld>
     <p:spTree>
@@ -4345,7 +4426,7 @@
 </p:sld>
 </file>
 
-<file path=ppt/slides/slide23.xml><?xml version="1.0" encoding="utf-8"?>
+<file path=ppt/slides/slide24.xml><?xml version="1.0" encoding="utf-8"?>
 <p:sld xmlns:a="http://schemas.openxmlformats.org/drawingml/2006/main" xmlns:r="http://schemas.openxmlformats.org/officeDocument/2006/relationships" xmlns:p="http://schemas.openxmlformats.org/presentationml/2006/main">
   <p:cSld>
     <p:spTree>
@@ -4392,7 +4473,7 @@
 </p:sld>
 </file>
 
-<file path=ppt/slides/slide24.xml><?xml version="1.0" encoding="utf-8"?>
+<file path=ppt/slides/slide25.xml><?xml version="1.0" encoding="utf-8"?>
 <p:sld xmlns:a="http://schemas.openxmlformats.org/drawingml/2006/main" xmlns:r="http://schemas.openxmlformats.org/officeDocument/2006/relationships" xmlns:p="http://schemas.openxmlformats.org/presentationml/2006/main">
   <p:cSld>
     <p:spTree>
@@ -4469,7 +4550,7 @@
 </p:sld>
 </file>
 
-<file path=ppt/slides/slide25.xml><?xml version="1.0" encoding="utf-8"?>
+<file path=ppt/slides/slide26.xml><?xml version="1.0" encoding="utf-8"?>
 <p:sld xmlns:a="http://schemas.openxmlformats.org/drawingml/2006/main" xmlns:r="http://schemas.openxmlformats.org/officeDocument/2006/relationships" xmlns:p="http://schemas.openxmlformats.org/presentationml/2006/main">
   <p:cSld>
     <p:spTree>
@@ -4546,7 +4627,7 @@
 </p:sld>
 </file>
 
-<file path=ppt/slides/slide26.xml><?xml version="1.0" encoding="utf-8"?>
+<file path=ppt/slides/slide27.xml><?xml version="1.0" encoding="utf-8"?>
 <p:sld xmlns:a="http://schemas.openxmlformats.org/drawingml/2006/main" xmlns:r="http://schemas.openxmlformats.org/officeDocument/2006/relationships" xmlns:p="http://schemas.openxmlformats.org/presentationml/2006/main">
   <p:cSld>
     <p:spTree>
@@ -4593,7 +4674,7 @@
 </p:sld>
 </file>
 
-<file path=ppt/slides/slide27.xml><?xml version="1.0" encoding="utf-8"?>
+<file path=ppt/slides/slide28.xml><?xml version="1.0" encoding="utf-8"?>
 <p:sld xmlns:a="http://schemas.openxmlformats.org/drawingml/2006/main" xmlns:r="http://schemas.openxmlformats.org/officeDocument/2006/relationships" xmlns:p="http://schemas.openxmlformats.org/presentationml/2006/main">
   <p:cSld>
     <p:spTree>
@@ -4670,7 +4751,7 @@
 </p:sld>
 </file>
 
-<file path=ppt/slides/slide28.xml><?xml version="1.0" encoding="utf-8"?>
+<file path=ppt/slides/slide29.xml><?xml version="1.0" encoding="utf-8"?>
 <p:sld xmlns:a="http://schemas.openxmlformats.org/drawingml/2006/main" xmlns:r="http://schemas.openxmlformats.org/officeDocument/2006/relationships" xmlns:p="http://schemas.openxmlformats.org/presentationml/2006/main">
   <p:cSld>
     <p:spTree>
@@ -4717,7 +4798,107 @@
 </p:sld>
 </file>
 
-<file path=ppt/slides/slide29.xml><?xml version="1.0" encoding="utf-8"?>
+<file path=ppt/slides/slide3.xml><?xml version="1.0" encoding="utf-8"?>
+<p:sld xmlns:a="http://schemas.openxmlformats.org/drawingml/2006/main" xmlns:r="http://schemas.openxmlformats.org/officeDocument/2006/relationships" xmlns:p="http://schemas.openxmlformats.org/presentationml/2006/main">
+  <p:cSld>
+    <p:spTree>
+      <p:nvGrpSpPr>
+        <p:cNvPr id="1" name=""/>
+        <p:cNvGrpSpPr/>
+        <p:nvPr/>
+      </p:nvGrpSpPr>
+      <p:grpSpPr>
+        <a:xfrm>
+          <a:off x="0" y="0"/>
+          <a:ext cx="0" cy="0"/>
+          <a:chOff x="0" y="0"/>
+          <a:chExt cx="0" cy="0"/>
+        </a:xfrm>
+      </p:grpSpPr>
+      <p:sp>
+        <p:nvSpPr>
+          <p:cNvPr id="2" name="Title 1"/>
+          <p:cNvSpPr>
+            <a:spLocks noGrp="1"/>
+          </p:cNvSpPr>
+          <p:nvPr>
+            <p:ph type="title"/>
+          </p:nvPr>
+        </p:nvSpPr>
+        <p:spPr/>
+        <p:txBody>
+          <a:bodyPr/>
+          <a:lstStyle/>
+          <a:p>
+            <a:pPr lvl="0" indent="0" marL="0">
+              <a:buNone/>
+            </a:pPr>
+            <a:r>
+              <a:rPr/>
+              <a:t>Fondos seleccionados</a:t>
+            </a:r>
+          </a:p>
+        </p:txBody>
+      </p:sp>
+      <p:sp>
+        <p:nvSpPr>
+          <p:cNvPr id="3" name="Content Placeholder 2"/>
+          <p:cNvSpPr>
+            <a:spLocks noGrp="1"/>
+          </p:cNvSpPr>
+          <p:nvPr>
+            <p:ph idx="1"/>
+          </p:nvPr>
+        </p:nvSpPr>
+        <p:spPr/>
+        <p:txBody>
+          <a:bodyPr/>
+          <a:lstStyle/>
+          <a:p>
+            <a:pPr lvl="0" indent="0" marL="0">
+              <a:buNone/>
+            </a:pPr>
+            <a:r>
+              <a:rPr/>
+              <a:t>La característica principal para elegir un fondo es que tenga un track record largo haciendo lo mismo.</a:t>
+            </a:r>
+          </a:p>
+          <a:p>
+            <a:pPr lvl="0"/>
+            <a:r>
+              <a:rPr/>
+              <a:t>Fondos de la ‘vieja escuela’.</a:t>
+            </a:r>
+          </a:p>
+          <a:p>
+            <a:pPr lvl="1"/>
+            <a:r>
+              <a:rPr/>
+              <a:t>Mulvaney, Dunn, Chesapeake.</a:t>
+            </a:r>
+          </a:p>
+          <a:p>
+            <a:pPr lvl="0"/>
+            <a:r>
+              <a:rPr/>
+              <a:t>Fondos ‘institucionales’.</a:t>
+            </a:r>
+          </a:p>
+          <a:p>
+            <a:pPr lvl="1"/>
+            <a:r>
+              <a:rPr/>
+              <a:t>Lynx, Transtrend, Crabel.</a:t>
+            </a:r>
+          </a:p>
+        </p:txBody>
+      </p:sp>
+    </p:spTree>
+  </p:cSld>
+</p:sld>
+</file>
+
+<file path=ppt/slides/slide30.xml><?xml version="1.0" encoding="utf-8"?>
 <p:sld xmlns:a="http://schemas.openxmlformats.org/drawingml/2006/main" xmlns:r="http://schemas.openxmlformats.org/officeDocument/2006/relationships" xmlns:p="http://schemas.openxmlformats.org/presentationml/2006/main">
   <p:cSld>
     <p:spTree>
@@ -4794,107 +4975,7 @@
 </p:sld>
 </file>
 
-<file path=ppt/slides/slide3.xml><?xml version="1.0" encoding="utf-8"?>
-<p:sld xmlns:a="http://schemas.openxmlformats.org/drawingml/2006/main" xmlns:r="http://schemas.openxmlformats.org/officeDocument/2006/relationships" xmlns:p="http://schemas.openxmlformats.org/presentationml/2006/main">
-  <p:cSld>
-    <p:spTree>
-      <p:nvGrpSpPr>
-        <p:cNvPr id="1" name=""/>
-        <p:cNvGrpSpPr/>
-        <p:nvPr/>
-      </p:nvGrpSpPr>
-      <p:grpSpPr>
-        <a:xfrm>
-          <a:off x="0" y="0"/>
-          <a:ext cx="0" cy="0"/>
-          <a:chOff x="0" y="0"/>
-          <a:chExt cx="0" cy="0"/>
-        </a:xfrm>
-      </p:grpSpPr>
-      <p:sp>
-        <p:nvSpPr>
-          <p:cNvPr id="2" name="Title 1"/>
-          <p:cNvSpPr>
-            <a:spLocks noGrp="1"/>
-          </p:cNvSpPr>
-          <p:nvPr>
-            <p:ph type="title"/>
-          </p:nvPr>
-        </p:nvSpPr>
-        <p:spPr/>
-        <p:txBody>
-          <a:bodyPr/>
-          <a:lstStyle/>
-          <a:p>
-            <a:pPr lvl="0" indent="0" marL="0">
-              <a:buNone/>
-            </a:pPr>
-            <a:r>
-              <a:rPr/>
-              <a:t>Fondos seleccionados</a:t>
-            </a:r>
-          </a:p>
-        </p:txBody>
-      </p:sp>
-      <p:sp>
-        <p:nvSpPr>
-          <p:cNvPr id="3" name="Content Placeholder 2"/>
-          <p:cNvSpPr>
-            <a:spLocks noGrp="1"/>
-          </p:cNvSpPr>
-          <p:nvPr>
-            <p:ph idx="1"/>
-          </p:nvPr>
-        </p:nvSpPr>
-        <p:spPr/>
-        <p:txBody>
-          <a:bodyPr/>
-          <a:lstStyle/>
-          <a:p>
-            <a:pPr lvl="0" indent="0" marL="0">
-              <a:buNone/>
-            </a:pPr>
-            <a:r>
-              <a:rPr/>
-              <a:t>La característica principal para elegir un fondo es que tenga un track record largo haciendo lo mismo.</a:t>
-            </a:r>
-          </a:p>
-          <a:p>
-            <a:pPr lvl="0"/>
-            <a:r>
-              <a:rPr/>
-              <a:t>Fondos de la ‘vieja escuela’.</a:t>
-            </a:r>
-          </a:p>
-          <a:p>
-            <a:pPr lvl="1"/>
-            <a:r>
-              <a:rPr/>
-              <a:t>Mulvaney, Dunn, Chesapeake.</a:t>
-            </a:r>
-          </a:p>
-          <a:p>
-            <a:pPr lvl="0"/>
-            <a:r>
-              <a:rPr/>
-              <a:t>Fondos ‘institucionales’.</a:t>
-            </a:r>
-          </a:p>
-          <a:p>
-            <a:pPr lvl="1"/>
-            <a:r>
-              <a:rPr/>
-              <a:t>Lynx, Transtrend, Crabel.</a:t>
-            </a:r>
-          </a:p>
-        </p:txBody>
-      </p:sp>
-    </p:spTree>
-  </p:cSld>
-</p:sld>
-</file>
-
-<file path=ppt/slides/slide30.xml><?xml version="1.0" encoding="utf-8"?>
+<file path=ppt/slides/slide31.xml><?xml version="1.0" encoding="utf-8"?>
 <p:sld xmlns:a="http://schemas.openxmlformats.org/drawingml/2006/main" xmlns:r="http://schemas.openxmlformats.org/officeDocument/2006/relationships" xmlns:p="http://schemas.openxmlformats.org/presentationml/2006/main">
   <p:cSld>
     <p:spTree>
@@ -4971,7 +5052,238 @@
 </p:sld>
 </file>
 
-<file path=ppt/slides/slide31.xml><?xml version="1.0" encoding="utf-8"?>
+<file path=ppt/slides/slide32.xml><?xml version="1.0" encoding="utf-8"?>
+<p:sld xmlns:a="http://schemas.openxmlformats.org/drawingml/2006/main" xmlns:r="http://schemas.openxmlformats.org/officeDocument/2006/relationships" xmlns:p="http://schemas.openxmlformats.org/presentationml/2006/main">
+  <p:cSld>
+    <p:spTree>
+      <p:nvGrpSpPr>
+        <p:cNvPr id="1" name=""/>
+        <p:cNvGrpSpPr/>
+        <p:nvPr/>
+      </p:nvGrpSpPr>
+      <p:grpSpPr>
+        <a:xfrm>
+          <a:off x="0" y="0"/>
+          <a:ext cx="0" cy="0"/>
+          <a:chOff x="0" y="0"/>
+          <a:chExt cx="0" cy="0"/>
+        </a:xfrm>
+      </p:grpSpPr>
+      <p:sp>
+        <p:nvSpPr>
+          <p:cNvPr id="2" name="Title 1"/>
+          <p:cNvSpPr>
+            <a:spLocks noGrp="1"/>
+          </p:cNvSpPr>
+          <p:nvPr>
+            <p:ph type="title"/>
+          </p:nvPr>
+        </p:nvSpPr>
+        <p:spPr/>
+        <p:txBody>
+          <a:bodyPr/>
+          <a:lstStyle/>
+          <a:p>
+            <a:pPr lvl="0" indent="0" marL="0">
+              <a:buNone/>
+            </a:pPr>
+            <a:r>
+              <a:rPr/>
+              <a:t>Bill Dunn: el track record más largo</a:t>
+            </a:r>
+          </a:p>
+        </p:txBody>
+      </p:sp>
+      <p:pic>
+        <p:nvPicPr>
+          <p:cNvPr descr="https://imgs.search.brave.com/M5BALVPxbJ5Y2RFO07BXa_5Zd5On-p_7HeVpN0JXwt0/rs:fit:660:494:1/g:ce/aHR0cHM6Ly93d3cu/dHJlbmRmb2xsb3dp/bmcuY29tL2ltYWdl/cy9jb21wMjAxNy5q/cGc.png" id="0" name="Picture 1"/>
+          <p:cNvPicPr>
+            <a:picLocks noGrp="1" noChangeAspect="1"/>
+          </p:cNvPicPr>
+          <p:nvPr/>
+        </p:nvPicPr>
+        <p:blipFill>
+          <a:blip r:embed="rId2"/>
+          <a:stretch>
+            <a:fillRect/>
+          </a:stretch>
+        </p:blipFill>
+        <p:spPr bwMode="auto">
+          <a:xfrm>
+            <a:off x="2032000" y="1193800"/>
+            <a:ext cx="5080000" cy="3390900"/>
+          </a:xfrm>
+          <a:prstGeom prst="rect">
+            <a:avLst/>
+          </a:prstGeom>
+          <a:noFill/>
+          <a:ln w="9525">
+            <a:noFill/>
+            <a:headEnd/>
+            <a:tailEnd/>
+          </a:ln>
+        </p:spPr>
+      </p:pic>
+    </p:spTree>
+  </p:cSld>
+</p:sld>
+</file>
+
+<file path=ppt/slides/slide33.xml><?xml version="1.0" encoding="utf-8"?>
+<p:sld xmlns:a="http://schemas.openxmlformats.org/drawingml/2006/main" xmlns:r="http://schemas.openxmlformats.org/officeDocument/2006/relationships" xmlns:p="http://schemas.openxmlformats.org/presentationml/2006/main">
+  <p:cSld>
+    <p:spTree>
+      <p:nvGrpSpPr>
+        <p:cNvPr id="1" name=""/>
+        <p:cNvGrpSpPr/>
+        <p:nvPr/>
+      </p:nvGrpSpPr>
+      <p:grpSpPr>
+        <a:xfrm>
+          <a:off x="0" y="0"/>
+          <a:ext cx="0" cy="0"/>
+          <a:chOff x="0" y="0"/>
+          <a:chExt cx="0" cy="0"/>
+        </a:xfrm>
+      </p:grpSpPr>
+      <p:sp>
+        <p:nvSpPr>
+          <p:cNvPr id="2" name="Title 1"/>
+          <p:cNvSpPr>
+            <a:spLocks noGrp="1"/>
+          </p:cNvSpPr>
+          <p:nvPr>
+            <p:ph type="title"/>
+          </p:nvPr>
+        </p:nvSpPr>
+        <p:spPr/>
+        <p:txBody>
+          <a:bodyPr/>
+          <a:lstStyle/>
+          <a:p>
+            <a:pPr lvl="0" indent="0" marL="0">
+              <a:buNone/>
+            </a:pPr>
+            <a:r>
+              <a:rPr/>
+              <a:t>Bill Dunn: Riesgo idiosincrático</a:t>
+            </a:r>
+          </a:p>
+        </p:txBody>
+      </p:sp>
+      <p:pic>
+        <p:nvPicPr>
+          <p:cNvPr descr="images/idiosincracia%20de%20Bill%20Dunn.png" id="0" name="Picture 1"/>
+          <p:cNvPicPr>
+            <a:picLocks noGrp="1" noChangeAspect="1"/>
+          </p:cNvPicPr>
+          <p:nvPr/>
+        </p:nvPicPr>
+        <p:blipFill>
+          <a:blip r:embed="rId2"/>
+          <a:stretch>
+            <a:fillRect/>
+          </a:stretch>
+        </p:blipFill>
+        <p:spPr bwMode="auto">
+          <a:xfrm>
+            <a:off x="2082800" y="1193800"/>
+            <a:ext cx="4991100" cy="3390900"/>
+          </a:xfrm>
+          <a:prstGeom prst="rect">
+            <a:avLst/>
+          </a:prstGeom>
+          <a:noFill/>
+          <a:ln w="9525">
+            <a:noFill/>
+            <a:headEnd/>
+            <a:tailEnd/>
+          </a:ln>
+        </p:spPr>
+      </p:pic>
+    </p:spTree>
+  </p:cSld>
+</p:sld>
+</file>
+
+<file path=ppt/slides/slide34.xml><?xml version="1.0" encoding="utf-8"?>
+<p:sld xmlns:a="http://schemas.openxmlformats.org/drawingml/2006/main" xmlns:r="http://schemas.openxmlformats.org/officeDocument/2006/relationships" xmlns:p="http://schemas.openxmlformats.org/presentationml/2006/main">
+  <p:cSld>
+    <p:spTree>
+      <p:nvGrpSpPr>
+        <p:cNvPr id="1" name=""/>
+        <p:cNvGrpSpPr/>
+        <p:nvPr/>
+      </p:nvGrpSpPr>
+      <p:grpSpPr>
+        <a:xfrm>
+          <a:off x="0" y="0"/>
+          <a:ext cx="0" cy="0"/>
+          <a:chOff x="0" y="0"/>
+          <a:chExt cx="0" cy="0"/>
+        </a:xfrm>
+      </p:grpSpPr>
+      <p:sp>
+        <p:nvSpPr>
+          <p:cNvPr id="2" name="Title 1"/>
+          <p:cNvSpPr>
+            <a:spLocks noGrp="1"/>
+          </p:cNvSpPr>
+          <p:nvPr>
+            <p:ph type="title"/>
+          </p:nvPr>
+        </p:nvSpPr>
+        <p:spPr/>
+        <p:txBody>
+          <a:bodyPr/>
+          <a:lstStyle/>
+          <a:p>
+            <a:pPr lvl="0" indent="0" marL="0">
+              <a:buNone/>
+            </a:pPr>
+            <a:r>
+              <a:rPr/>
+              <a:t>Bill Dunn: el negocio</a:t>
+            </a:r>
+          </a:p>
+        </p:txBody>
+      </p:sp>
+      <p:pic>
+        <p:nvPicPr>
+          <p:cNvPr descr="images/Bill%20Dunn%20AUM.png" id="0" name="Picture 1"/>
+          <p:cNvPicPr>
+            <a:picLocks noGrp="1" noChangeAspect="1"/>
+          </p:cNvPicPr>
+          <p:nvPr/>
+        </p:nvPicPr>
+        <p:blipFill>
+          <a:blip r:embed="rId2"/>
+          <a:stretch>
+            <a:fillRect/>
+          </a:stretch>
+        </p:blipFill>
+        <p:spPr bwMode="auto">
+          <a:xfrm>
+            <a:off x="1231900" y="1193800"/>
+            <a:ext cx="6680200" cy="3390900"/>
+          </a:xfrm>
+          <a:prstGeom prst="rect">
+            <a:avLst/>
+          </a:prstGeom>
+          <a:noFill/>
+          <a:ln w="9525">
+            <a:noFill/>
+            <a:headEnd/>
+            <a:tailEnd/>
+          </a:ln>
+        </p:spPr>
+      </p:pic>
+    </p:spTree>
+  </p:cSld>
+</p:sld>
+</file>
+
+<file path=ppt/slides/slide35.xml><?xml version="1.0" encoding="utf-8"?>
 <p:sld xmlns:a="http://schemas.openxmlformats.org/drawingml/2006/main" xmlns:r="http://schemas.openxmlformats.org/officeDocument/2006/relationships" xmlns:p="http://schemas.openxmlformats.org/presentationml/2006/main">
   <p:cSld>
     <p:spTree>
@@ -5048,7 +5360,7 @@
 </p:sld>
 </file>
 
-<file path=ppt/slides/slide32.xml><?xml version="1.0" encoding="utf-8"?>
+<file path=ppt/slides/slide36.xml><?xml version="1.0" encoding="utf-8"?>
 <p:sld xmlns:a="http://schemas.openxmlformats.org/drawingml/2006/main" xmlns:r="http://schemas.openxmlformats.org/officeDocument/2006/relationships" xmlns:p="http://schemas.openxmlformats.org/presentationml/2006/main">
   <p:cSld>
     <p:spTree>
@@ -5394,36 +5706,6 @@
           </a:p>
         </p:txBody>
       </p:sp>
-      <p:pic>
-        <p:nvPicPr>
-          <p:cNvPr descr="images/agregando%20trend%20following%20a%20benchmark.png" id="0" name="Picture 1"/>
-          <p:cNvPicPr>
-            <a:picLocks noGrp="1" noChangeAspect="1"/>
-          </p:cNvPicPr>
-          <p:nvPr/>
-        </p:nvPicPr>
-        <p:blipFill>
-          <a:blip r:embed="rId2"/>
-          <a:stretch>
-            <a:fillRect/>
-          </a:stretch>
-        </p:blipFill>
-        <p:spPr bwMode="auto">
-          <a:xfrm>
-            <a:off x="1130300" y="1193800"/>
-            <a:ext cx="6883400" cy="3390900"/>
-          </a:xfrm>
-          <a:prstGeom prst="rect">
-            <a:avLst/>
-          </a:prstGeom>
-          <a:noFill/>
-          <a:ln w="9525">
-            <a:noFill/>
-            <a:headEnd/>
-            <a:tailEnd/>
-          </a:ln>
-        </p:spPr>
-      </p:pic>
     </p:spTree>
   </p:cSld>
 </p:sld>
@@ -5473,7 +5755,7 @@
       </p:sp>
       <p:pic>
         <p:nvPicPr>
-          <p:cNvPr descr="images/efecto%20de%20mezclar%20el%20benchmark%20con%20trend%20following.png" id="0" name="Picture 1"/>
+          <p:cNvPr descr="images/agregando%20trend%20following%20a%20benchmark.png" id="0" name="Picture 1"/>
           <p:cNvPicPr>
             <a:picLocks noGrp="1" noChangeAspect="1"/>
           </p:cNvPicPr>
@@ -5487,8 +5769,8 @@
         </p:blipFill>
         <p:spPr bwMode="auto">
           <a:xfrm>
-            <a:off x="2146300" y="1193800"/>
-            <a:ext cx="4838700" cy="3390900"/>
+            <a:off x="1130300" y="1193800"/>
+            <a:ext cx="6883400" cy="3390900"/>
           </a:xfrm>
           <a:prstGeom prst="rect">
             <a:avLst/>

</xml_diff>